<commit_message>
CheatSheets and presentation updates
</commit_message>
<xml_diff>
--- a/TypeScript.pptx
+++ b/TypeScript.pptx
@@ -9,34 +9,28 @@
     <p:sldId id="261" r:id="rId3"/>
     <p:sldId id="262" r:id="rId4"/>
     <p:sldId id="263" r:id="rId5"/>
-    <p:sldId id="257" r:id="rId6"/>
-    <p:sldId id="258" r:id="rId7"/>
-    <p:sldId id="259" r:id="rId8"/>
-    <p:sldId id="260" r:id="rId9"/>
-    <p:sldId id="279" r:id="rId10"/>
-    <p:sldId id="278" r:id="rId11"/>
-    <p:sldId id="280" r:id="rId12"/>
-    <p:sldId id="264" r:id="rId13"/>
-    <p:sldId id="265" r:id="rId14"/>
-    <p:sldId id="266" r:id="rId15"/>
-    <p:sldId id="267" r:id="rId16"/>
-    <p:sldId id="268" r:id="rId17"/>
-    <p:sldId id="269" r:id="rId18"/>
-    <p:sldId id="270" r:id="rId19"/>
-    <p:sldId id="271" r:id="rId20"/>
-    <p:sldId id="272" r:id="rId21"/>
-    <p:sldId id="273" r:id="rId22"/>
-    <p:sldId id="274" r:id="rId23"/>
-    <p:sldId id="275" r:id="rId24"/>
-    <p:sldId id="276" r:id="rId25"/>
-    <p:sldId id="277" r:id="rId26"/>
-    <p:sldId id="281" r:id="rId27"/>
-    <p:sldId id="282" r:id="rId28"/>
-    <p:sldId id="283" r:id="rId29"/>
-    <p:sldId id="284" r:id="rId30"/>
-    <p:sldId id="285" r:id="rId31"/>
-    <p:sldId id="286" r:id="rId32"/>
-    <p:sldId id="287" r:id="rId33"/>
+    <p:sldId id="288" r:id="rId6"/>
+    <p:sldId id="290" r:id="rId7"/>
+    <p:sldId id="257" r:id="rId8"/>
+    <p:sldId id="258" r:id="rId9"/>
+    <p:sldId id="289" r:id="rId10"/>
+    <p:sldId id="259" r:id="rId11"/>
+    <p:sldId id="260" r:id="rId12"/>
+    <p:sldId id="291" r:id="rId13"/>
+    <p:sldId id="293" r:id="rId14"/>
+    <p:sldId id="292" r:id="rId15"/>
+    <p:sldId id="294" r:id="rId16"/>
+    <p:sldId id="295" r:id="rId17"/>
+    <p:sldId id="296" r:id="rId18"/>
+    <p:sldId id="297" r:id="rId19"/>
+    <p:sldId id="298" r:id="rId20"/>
+    <p:sldId id="281" r:id="rId21"/>
+    <p:sldId id="282" r:id="rId22"/>
+    <p:sldId id="283" r:id="rId23"/>
+    <p:sldId id="284" r:id="rId24"/>
+    <p:sldId id="285" r:id="rId25"/>
+    <p:sldId id="286" r:id="rId26"/>
+    <p:sldId id="287" r:id="rId27"/>
   </p:sldIdLst>
   <p:sldSz cx="12192000" cy="6858000"/>
   <p:notesSz cx="6858000" cy="9144000"/>
@@ -329,7 +323,7 @@
           <a:p>
             <a:fld id="{4AAD347D-5ACD-4C99-B74B-A9C85AD731AF}" type="datetimeFigureOut">
               <a:rPr lang="en-US" dirty="0"/>
-              <a:t>2/12/2015</a:t>
+              <a:t>2/18/2015</a:t>
             </a:fld>
             <a:endParaRPr lang="en-US" dirty="0"/>
           </a:p>
@@ -599,7 +593,7 @@
           <a:p>
             <a:fld id="{4509A250-FF31-4206-8172-F9D3106AACB1}" type="datetimeFigureOut">
               <a:rPr lang="en-US" dirty="0"/>
-              <a:t>2/12/2015</a:t>
+              <a:t>2/18/2015</a:t>
             </a:fld>
             <a:endParaRPr lang="en-US" dirty="0"/>
           </a:p>
@@ -788,7 +782,7 @@
           <a:p>
             <a:fld id="{4509A250-FF31-4206-8172-F9D3106AACB1}" type="datetimeFigureOut">
               <a:rPr lang="en-US" dirty="0"/>
-              <a:t>2/12/2015</a:t>
+              <a:t>2/18/2015</a:t>
             </a:fld>
             <a:endParaRPr lang="en-US" dirty="0"/>
           </a:p>
@@ -1056,7 +1050,7 @@
           <a:p>
             <a:fld id="{4509A250-FF31-4206-8172-F9D3106AACB1}" type="datetimeFigureOut">
               <a:rPr lang="en-US" dirty="0"/>
-              <a:t>2/12/2015</a:t>
+              <a:t>2/18/2015</a:t>
             </a:fld>
             <a:endParaRPr lang="en-US" dirty="0"/>
           </a:p>
@@ -1392,7 +1386,7 @@
           <a:p>
             <a:fld id="{4509A250-FF31-4206-8172-F9D3106AACB1}" type="datetimeFigureOut">
               <a:rPr lang="en-US" dirty="0"/>
-              <a:t>2/12/2015</a:t>
+              <a:t>2/18/2015</a:t>
             </a:fld>
             <a:endParaRPr lang="en-US" dirty="0"/>
           </a:p>
@@ -2010,7 +2004,7 @@
           <a:p>
             <a:fld id="{4509A250-FF31-4206-8172-F9D3106AACB1}" type="datetimeFigureOut">
               <a:rPr lang="en-US" dirty="0"/>
-              <a:t>2/12/2015</a:t>
+              <a:t>2/18/2015</a:t>
             </a:fld>
             <a:endParaRPr lang="en-US" dirty="0"/>
           </a:p>
@@ -2865,7 +2859,7 @@
           <a:p>
             <a:fld id="{4509A250-FF31-4206-8172-F9D3106AACB1}" type="datetimeFigureOut">
               <a:rPr lang="en-US" dirty="0"/>
-              <a:t>2/12/2015</a:t>
+              <a:t>2/18/2015</a:t>
             </a:fld>
             <a:endParaRPr lang="en-US" dirty="0"/>
           </a:p>
@@ -3030,7 +3024,7 @@
           <a:p>
             <a:fld id="{4509A250-FF31-4206-8172-F9D3106AACB1}" type="datetimeFigureOut">
               <a:rPr lang="en-US" dirty="0"/>
-              <a:t>2/12/2015</a:t>
+              <a:t>2/18/2015</a:t>
             </a:fld>
             <a:endParaRPr lang="en-US" dirty="0"/>
           </a:p>
@@ -3205,7 +3199,7 @@
           <a:p>
             <a:fld id="{4509A250-FF31-4206-8172-F9D3106AACB1}" type="datetimeFigureOut">
               <a:rPr lang="en-US" dirty="0"/>
-              <a:t>2/12/2015</a:t>
+              <a:t>2/18/2015</a:t>
             </a:fld>
             <a:endParaRPr lang="en-US" dirty="0"/>
           </a:p>
@@ -3370,7 +3364,7 @@
           <a:p>
             <a:fld id="{4509A250-FF31-4206-8172-F9D3106AACB1}" type="datetimeFigureOut">
               <a:rPr lang="en-US" dirty="0"/>
-              <a:t>2/12/2015</a:t>
+              <a:t>2/18/2015</a:t>
             </a:fld>
             <a:endParaRPr lang="en-US" dirty="0"/>
           </a:p>
@@ -3612,7 +3606,7 @@
           <a:p>
             <a:fld id="{9796027F-7875-4030-9381-8BD8C4F21935}" type="datetimeFigureOut">
               <a:rPr lang="en-US" dirty="0"/>
-              <a:t>2/12/2015</a:t>
+              <a:t>2/18/2015</a:t>
             </a:fld>
             <a:endParaRPr lang="en-US" dirty="0"/>
           </a:p>
@@ -3899,7 +3893,7 @@
           <a:p>
             <a:fld id="{9796027F-7875-4030-9381-8BD8C4F21935}" type="datetimeFigureOut">
               <a:rPr lang="en-US" dirty="0"/>
-              <a:t>2/12/2015</a:t>
+              <a:t>2/18/2015</a:t>
             </a:fld>
             <a:endParaRPr lang="en-US" dirty="0"/>
           </a:p>
@@ -4338,7 +4332,7 @@
           <a:p>
             <a:fld id="{9796027F-7875-4030-9381-8BD8C4F21935}" type="datetimeFigureOut">
               <a:rPr lang="en-US" dirty="0"/>
-              <a:t>2/12/2015</a:t>
+              <a:t>2/18/2015</a:t>
             </a:fld>
             <a:endParaRPr lang="en-US" dirty="0"/>
           </a:p>
@@ -4451,7 +4445,7 @@
           <a:p>
             <a:fld id="{4509A250-FF31-4206-8172-F9D3106AACB1}" type="datetimeFigureOut">
               <a:rPr lang="en-US" dirty="0"/>
-              <a:t>2/12/2015</a:t>
+              <a:t>2/18/2015</a:t>
             </a:fld>
             <a:endParaRPr lang="en-US" dirty="0"/>
           </a:p>
@@ -4541,7 +4535,7 @@
           <a:p>
             <a:fld id="{4509A250-FF31-4206-8172-F9D3106AACB1}" type="datetimeFigureOut">
               <a:rPr lang="en-US" dirty="0"/>
-              <a:t>2/12/2015</a:t>
+              <a:t>2/18/2015</a:t>
             </a:fld>
             <a:endParaRPr lang="en-US" dirty="0"/>
           </a:p>
@@ -4815,7 +4809,7 @@
           <a:p>
             <a:fld id="{4509A250-FF31-4206-8172-F9D3106AACB1}" type="datetimeFigureOut">
               <a:rPr lang="en-US" dirty="0"/>
-              <a:t>2/12/2015</a:t>
+              <a:t>2/18/2015</a:t>
             </a:fld>
             <a:endParaRPr lang="en-US" dirty="0"/>
           </a:p>
@@ -5085,7 +5079,7 @@
           <a:p>
             <a:fld id="{4509A250-FF31-4206-8172-F9D3106AACB1}" type="datetimeFigureOut">
               <a:rPr lang="en-US" dirty="0"/>
-              <a:t>2/12/2015</a:t>
+              <a:t>2/18/2015</a:t>
             </a:fld>
             <a:endParaRPr lang="en-US" dirty="0"/>
           </a:p>
@@ -5509,7 +5503,7 @@
           <a:p>
             <a:fld id="{4AAD347D-5ACD-4C99-B74B-A9C85AD731AF}" type="datetimeFigureOut">
               <a:rPr lang="en-US" dirty="0"/>
-              <a:t>2/12/2015</a:t>
+              <a:t>2/18/2015</a:t>
             </a:fld>
             <a:endParaRPr lang="en-US" dirty="0"/>
           </a:p>
@@ -6110,7 +6104,7 @@
           <a:p>
             <a:r>
               <a:rPr lang="nb-NO" dirty="0" smtClean="0"/>
-              <a:t>The basics</a:t>
+              <a:t>Installation: SublimeText 3</a:t>
             </a:r>
             <a:endParaRPr lang="en-US" dirty="0"/>
           </a:p>
@@ -6133,13 +6127,16 @@
           <a:p>
             <a:r>
               <a:rPr lang="nb-NO" dirty="0" smtClean="0"/>
-              <a:t>var age = 18; // Type inference. TypeScript gives it the type number</a:t>
-            </a:r>
-          </a:p>
-          <a:p>
-            <a:r>
-              <a:rPr lang="nb-NO" dirty="0" smtClean="0"/>
-              <a:t>var age: number = 18; // Exact same thing, but we declare this to be of the number type.</a:t>
+              <a:t>Tools -&gt; Build Systems -&gt; New Build System -&gt; Copy &amp; paste content from «typescript.sublime-build» file in git repo</a:t>
+            </a:r>
+          </a:p>
+          <a:p>
+            <a:endParaRPr lang="nb-NO" dirty="0"/>
+          </a:p>
+          <a:p>
+            <a:r>
+              <a:rPr lang="nb-NO" dirty="0" smtClean="0"/>
+              <a:t>Set as default build system, build with ctrl+b</a:t>
             </a:r>
             <a:endParaRPr lang="en-US" dirty="0"/>
           </a:p>
@@ -6148,7 +6145,7 @@
     </p:spTree>
     <p:extLst>
       <p:ext uri="{BB962C8B-B14F-4D97-AF65-F5344CB8AC3E}">
-        <p14:creationId xmlns:p14="http://schemas.microsoft.com/office/powerpoint/2010/main" val="2635933658"/>
+        <p14:creationId xmlns:p14="http://schemas.microsoft.com/office/powerpoint/2010/main" val="3926077882"/>
       </p:ext>
     </p:extLst>
   </p:cSld>
@@ -6199,7 +6196,7 @@
           <a:p>
             <a:r>
               <a:rPr lang="nb-NO" dirty="0" smtClean="0"/>
-              <a:t>The basics</a:t>
+              <a:t>Installation: node/npm and cmd</a:t>
             </a:r>
             <a:endParaRPr lang="en-US" dirty="0"/>
           </a:p>
@@ -6215,55 +6212,250 @@
             <p:ph idx="1"/>
           </p:nvPr>
         </p:nvSpPr>
-        <p:spPr/>
-        <p:txBody>
-          <a:bodyPr/>
-          <a:lstStyle/>
-          <a:p>
-            <a:r>
-              <a:rPr lang="nb-NO" dirty="0" smtClean="0"/>
-              <a:t>Var func = function(n1: number, n2: number){</a:t>
-            </a:r>
-          </a:p>
-          <a:p>
-            <a:pPr lvl="1"/>
-            <a:r>
-              <a:rPr lang="nb-NO" dirty="0" smtClean="0"/>
-              <a:t>Return n1 + n2;</a:t>
+        <p:spPr>
+          <a:xfrm>
+            <a:off x="1104293" y="1591600"/>
+            <a:ext cx="8946541" cy="4195481"/>
+          </a:xfrm>
+        </p:spPr>
+        <p:txBody>
+          <a:bodyPr/>
+          <a:lstStyle/>
+          <a:p>
+            <a:r>
+              <a:rPr lang="nb-NO" dirty="0" smtClean="0"/>
+              <a:t>With </a:t>
+            </a:r>
+            <a:r>
+              <a:rPr lang="nb-NO" dirty="0" smtClean="0"/>
+              <a:t>node/npm: </a:t>
+            </a:r>
+            <a:r>
+              <a:rPr lang="nb-NO" dirty="0" smtClean="0">
+                <a:solidFill>
+                  <a:schemeClr val="accent2"/>
+                </a:solidFill>
+              </a:rPr>
+              <a:t>npm install –g typescript</a:t>
+            </a:r>
+            <a:r>
+              <a:rPr lang="nb-NO" dirty="0" smtClean="0"/>
+              <a:t> </a:t>
             </a:r>
             <a:endParaRPr lang="nb-NO" dirty="0"/>
           </a:p>
           <a:p>
             <a:r>
               <a:rPr lang="nb-NO" dirty="0" smtClean="0"/>
-              <a:t>}</a:t>
+              <a:t>By downloading and running installer:</a:t>
             </a:r>
           </a:p>
           <a:p>
             <a:endParaRPr lang="nb-NO" dirty="0"/>
           </a:p>
           <a:p>
-            <a:r>
-              <a:rPr lang="nb-NO" dirty="0" smtClean="0"/>
-              <a:t>Func: (n: number, n: number) =&gt; void = function(n1, n2){</a:t>
-            </a:r>
-          </a:p>
-          <a:p>
-            <a:endParaRPr lang="nb-NO" dirty="0"/>
-          </a:p>
-          <a:p>
-            <a:r>
-              <a:rPr lang="nb-NO" dirty="0" smtClean="0"/>
-              <a:t>}</a:t>
-            </a:r>
-            <a:endParaRPr lang="en-US" dirty="0"/>
+            <a:endParaRPr lang="en-US" dirty="0"/>
+          </a:p>
+        </p:txBody>
+      </p:sp>
+      <p:pic>
+        <p:nvPicPr>
+          <p:cNvPr id="5" name="Picture 4"/>
+          <p:cNvPicPr>
+            <a:picLocks noChangeAspect="1"/>
+          </p:cNvPicPr>
+          <p:nvPr/>
+        </p:nvPicPr>
+        <p:blipFill>
+          <a:blip r:embed="rId2">
+            <a:extLst>
+              <a:ext uri="{28A0092B-C50C-407E-A947-70E740481C1C}">
+                <a14:useLocalDpi xmlns:a14="http://schemas.microsoft.com/office/drawing/2010/main" val="0"/>
+              </a:ext>
+            </a:extLst>
+          </a:blip>
+          <a:stretch>
+            <a:fillRect/>
+          </a:stretch>
+        </p:blipFill>
+        <p:spPr>
+          <a:xfrm>
+            <a:off x="1260390" y="2741163"/>
+            <a:ext cx="5655733" cy="3606090"/>
+          </a:xfrm>
+          <a:prstGeom prst="rect">
+            <a:avLst/>
+          </a:prstGeom>
+          <a:noFill/>
+          <a:ln w="88900" cap="sq">
+            <a:solidFill>
+              <a:srgbClr val="FFFFFF"/>
+            </a:solidFill>
+            <a:miter lim="800000"/>
+          </a:ln>
+          <a:effectLst>
+            <a:outerShdw blurRad="55000" dist="18000" dir="5400000" algn="tl" rotWithShape="0">
+              <a:srgbClr val="000000">
+                <a:alpha val="40000"/>
+              </a:srgbClr>
+            </a:outerShdw>
+          </a:effectLst>
+          <a:scene3d>
+            <a:camera prst="orthographicFront"/>
+            <a:lightRig rig="twoPt" dir="t">
+              <a:rot lat="0" lon="0" rev="7200000"/>
+            </a:lightRig>
+          </a:scene3d>
+          <a:sp3d>
+            <a:bevelT w="25400" h="19050"/>
+            <a:contourClr>
+              <a:srgbClr val="FFFFFF"/>
+            </a:contourClr>
+          </a:sp3d>
+        </p:spPr>
+      </p:pic>
+      <p:sp>
+        <p:nvSpPr>
+          <p:cNvPr id="6" name="Rectangle 5"/>
+          <p:cNvSpPr/>
+          <p:nvPr/>
+        </p:nvSpPr>
+        <p:spPr>
+          <a:xfrm>
+            <a:off x="1771135" y="2932670"/>
+            <a:ext cx="1466335" cy="370703"/>
+          </a:xfrm>
+          <a:prstGeom prst="rect">
+            <a:avLst/>
+          </a:prstGeom>
+          <a:noFill/>
+          <a:ln w="38100">
+            <a:solidFill>
+              <a:srgbClr val="FF0000"/>
+            </a:solidFill>
+          </a:ln>
+        </p:spPr>
+        <p:style>
+          <a:lnRef idx="2">
+            <a:schemeClr val="accent1">
+              <a:shade val="50000"/>
+            </a:schemeClr>
+          </a:lnRef>
+          <a:fillRef idx="1">
+            <a:schemeClr val="accent1"/>
+          </a:fillRef>
+          <a:effectRef idx="0">
+            <a:schemeClr val="accent1"/>
+          </a:effectRef>
+          <a:fontRef idx="minor">
+            <a:schemeClr val="lt1"/>
+          </a:fontRef>
+        </p:style>
+        <p:txBody>
+          <a:bodyPr rtlCol="0" anchor="ctr"/>
+          <a:lstStyle/>
+          <a:p>
+            <a:pPr algn="ctr"/>
+            <a:endParaRPr lang="en-US"/>
+          </a:p>
+        </p:txBody>
+      </p:sp>
+      <p:sp>
+        <p:nvSpPr>
+          <p:cNvPr id="7" name="Rectangle 6"/>
+          <p:cNvSpPr/>
+          <p:nvPr/>
+        </p:nvSpPr>
+        <p:spPr>
+          <a:xfrm>
+            <a:off x="4699686" y="3328087"/>
+            <a:ext cx="1124465" cy="284206"/>
+          </a:xfrm>
+          <a:prstGeom prst="rect">
+            <a:avLst/>
+          </a:prstGeom>
+          <a:noFill/>
+          <a:ln w="38100">
+            <a:solidFill>
+              <a:srgbClr val="FF0000"/>
+            </a:solidFill>
+          </a:ln>
+        </p:spPr>
+        <p:style>
+          <a:lnRef idx="2">
+            <a:schemeClr val="accent1">
+              <a:shade val="50000"/>
+            </a:schemeClr>
+          </a:lnRef>
+          <a:fillRef idx="1">
+            <a:schemeClr val="accent1"/>
+          </a:fillRef>
+          <a:effectRef idx="0">
+            <a:schemeClr val="accent1"/>
+          </a:effectRef>
+          <a:fontRef idx="minor">
+            <a:schemeClr val="lt1"/>
+          </a:fontRef>
+        </p:style>
+        <p:txBody>
+          <a:bodyPr rtlCol="0" anchor="ctr"/>
+          <a:lstStyle/>
+          <a:p>
+            <a:pPr algn="ctr"/>
+            <a:endParaRPr lang="en-US"/>
+          </a:p>
+        </p:txBody>
+      </p:sp>
+      <p:sp>
+        <p:nvSpPr>
+          <p:cNvPr id="8" name="Rectangle 7"/>
+          <p:cNvSpPr/>
+          <p:nvPr/>
+        </p:nvSpPr>
+        <p:spPr>
+          <a:xfrm>
+            <a:off x="4444313" y="5523470"/>
+            <a:ext cx="2088292" cy="370703"/>
+          </a:xfrm>
+          <a:prstGeom prst="rect">
+            <a:avLst/>
+          </a:prstGeom>
+          <a:noFill/>
+          <a:ln w="38100">
+            <a:solidFill>
+              <a:srgbClr val="FF0000"/>
+            </a:solidFill>
+          </a:ln>
+        </p:spPr>
+        <p:style>
+          <a:lnRef idx="2">
+            <a:schemeClr val="accent1">
+              <a:shade val="50000"/>
+            </a:schemeClr>
+          </a:lnRef>
+          <a:fillRef idx="1">
+            <a:schemeClr val="accent1"/>
+          </a:fillRef>
+          <a:effectRef idx="0">
+            <a:schemeClr val="accent1"/>
+          </a:effectRef>
+          <a:fontRef idx="minor">
+            <a:schemeClr val="lt1"/>
+          </a:fontRef>
+        </p:style>
+        <p:txBody>
+          <a:bodyPr rtlCol="0" anchor="ctr"/>
+          <a:lstStyle/>
+          <a:p>
+            <a:pPr algn="ctr"/>
+            <a:endParaRPr lang="en-US"/>
           </a:p>
         </p:txBody>
       </p:sp>
     </p:spTree>
     <p:extLst>
       <p:ext uri="{BB962C8B-B14F-4D97-AF65-F5344CB8AC3E}">
-        <p14:creationId xmlns:p14="http://schemas.microsoft.com/office/powerpoint/2010/main" val="2795866883"/>
+        <p14:creationId xmlns:p14="http://schemas.microsoft.com/office/powerpoint/2010/main" val="1035945185"/>
       </p:ext>
     </p:extLst>
   </p:cSld>
@@ -6299,12 +6491,12 @@
       </p:grpSpPr>
       <p:sp>
         <p:nvSpPr>
-          <p:cNvPr id="2" name="Title 1"/>
-          <p:cNvSpPr>
-            <a:spLocks noGrp="1"/>
-          </p:cNvSpPr>
-          <p:nvPr>
-            <p:ph type="title"/>
+          <p:cNvPr id="4" name="Title 3"/>
+          <p:cNvSpPr>
+            <a:spLocks noGrp="1"/>
+          </p:cNvSpPr>
+          <p:nvPr>
+            <p:ph type="ctrTitle"/>
           </p:nvPr>
         </p:nvSpPr>
         <p:spPr/>
@@ -6314,101 +6506,22 @@
           <a:p>
             <a:r>
               <a:rPr lang="nb-NO" dirty="0" smtClean="0"/>
-              <a:t>Modules: teach me!</a:t>
-            </a:r>
-            <a:endParaRPr lang="en-US" dirty="0"/>
-          </a:p>
-        </p:txBody>
-      </p:sp>
-      <p:sp>
-        <p:nvSpPr>
-          <p:cNvPr id="3" name="Content Placeholder 2"/>
-          <p:cNvSpPr>
-            <a:spLocks noGrp="1"/>
-          </p:cNvSpPr>
-          <p:nvPr>
-            <p:ph idx="1"/>
-          </p:nvPr>
-        </p:nvSpPr>
-        <p:spPr/>
-        <p:txBody>
-          <a:bodyPr/>
-          <a:lstStyle/>
-          <a:p>
-            <a:r>
-              <a:rPr lang="nb-NO" dirty="0" smtClean="0"/>
-              <a:t>Is an encapsulated scope with functions</a:t>
-            </a:r>
-          </a:p>
-          <a:p>
-            <a:endParaRPr lang="nb-NO" dirty="0" smtClean="0"/>
-          </a:p>
-          <a:p>
-            <a:r>
-              <a:rPr lang="nb-NO" dirty="0" smtClean="0"/>
-              <a:t>Not instantiated/«new’ed up»</a:t>
-            </a:r>
-          </a:p>
-          <a:p>
-            <a:endParaRPr lang="nb-NO" dirty="0" smtClean="0"/>
-          </a:p>
-          <a:p>
-            <a:r>
-              <a:rPr lang="nb-NO" dirty="0" smtClean="0"/>
-              <a:t>You call the functions directly on the module.</a:t>
-            </a:r>
-          </a:p>
-          <a:p>
-            <a:endParaRPr lang="nb-NO" dirty="0" smtClean="0"/>
-          </a:p>
-          <a:p>
-            <a:r>
-              <a:rPr lang="nb-NO" dirty="0" smtClean="0"/>
-              <a:t>Equivalent to a </a:t>
-            </a:r>
-            <a:r>
-              <a:rPr lang="nb-NO" dirty="0" smtClean="0">
-                <a:solidFill>
-                  <a:schemeClr val="accent2"/>
-                </a:solidFill>
-                <a:latin typeface="Consolas" panose="020B0609020204030204" pitchFamily="49" charset="0"/>
-                <a:cs typeface="Consolas" panose="020B0609020204030204" pitchFamily="49" charset="0"/>
-              </a:rPr>
-              <a:t>module </a:t>
-            </a:r>
-            <a:r>
-              <a:rPr lang="nb-NO" dirty="0" smtClean="0"/>
-              <a:t>in F#</a:t>
-            </a:r>
-          </a:p>
-          <a:p>
-            <a:endParaRPr lang="nb-NO" dirty="0" smtClean="0"/>
-          </a:p>
-          <a:p>
-            <a:r>
-              <a:rPr lang="nb-NO" dirty="0" smtClean="0"/>
-              <a:t>Kind off like a static class in C#</a:t>
-            </a:r>
+              <a:t>Language features</a:t>
+            </a:r>
+            <a:endParaRPr lang="en-US" dirty="0"/>
           </a:p>
         </p:txBody>
       </p:sp>
     </p:spTree>
     <p:extLst>
       <p:ext uri="{BB962C8B-B14F-4D97-AF65-F5344CB8AC3E}">
-        <p14:creationId xmlns:p14="http://schemas.microsoft.com/office/powerpoint/2010/main" val="973919753"/>
+        <p14:creationId xmlns:p14="http://schemas.microsoft.com/office/powerpoint/2010/main" val="2291625426"/>
       </p:ext>
     </p:extLst>
   </p:cSld>
   <p:clrMapOvr>
     <a:masterClrMapping/>
   </p:clrMapOvr>
-  <p:timing>
-    <p:tnLst>
-      <p:par>
-        <p:cTn id="1" dur="indefinite" restart="never" nodeType="tmRoot"/>
-      </p:par>
-    </p:tnLst>
-  </p:timing>
 </p:sld>
 </file>
 
@@ -6446,48 +6559,46 @@
           <a:p>
             <a:r>
               <a:rPr lang="nb-NO" dirty="0" smtClean="0"/>
-              <a:t>Modules: show me!</a:t>
-            </a:r>
-            <a:endParaRPr lang="en-US" dirty="0"/>
-          </a:p>
-        </p:txBody>
-      </p:sp>
-      <p:sp>
-        <p:nvSpPr>
-          <p:cNvPr id="3" name="Content Placeholder 2"/>
-          <p:cNvSpPr>
-            <a:spLocks noGrp="1"/>
-          </p:cNvSpPr>
-          <p:nvPr>
-            <p:ph idx="1"/>
-          </p:nvPr>
-        </p:nvSpPr>
-        <p:spPr/>
-        <p:txBody>
-          <a:bodyPr/>
-          <a:lstStyle/>
-          <a:p>
-            <a:endParaRPr lang="en-US" dirty="0"/>
-          </a:p>
-        </p:txBody>
-      </p:sp>
+              <a:t>Resources</a:t>
+            </a:r>
+            <a:endParaRPr lang="en-US" dirty="0"/>
+          </a:p>
+        </p:txBody>
+      </p:sp>
+      <p:pic>
+        <p:nvPicPr>
+          <p:cNvPr id="4" name="Picture 3"/>
+          <p:cNvPicPr>
+            <a:picLocks noChangeAspect="1"/>
+          </p:cNvPicPr>
+          <p:nvPr/>
+        </p:nvPicPr>
+        <p:blipFill>
+          <a:blip r:embed="rId2"/>
+          <a:stretch>
+            <a:fillRect/>
+          </a:stretch>
+        </p:blipFill>
+        <p:spPr>
+          <a:xfrm>
+            <a:off x="734198" y="2204650"/>
+            <a:ext cx="10337578" cy="1642419"/>
+          </a:xfrm>
+          <a:prstGeom prst="rect">
+            <a:avLst/>
+          </a:prstGeom>
+        </p:spPr>
+      </p:pic>
     </p:spTree>
     <p:extLst>
       <p:ext uri="{BB962C8B-B14F-4D97-AF65-F5344CB8AC3E}">
-        <p14:creationId xmlns:p14="http://schemas.microsoft.com/office/powerpoint/2010/main" val="577322335"/>
+        <p14:creationId xmlns:p14="http://schemas.microsoft.com/office/powerpoint/2010/main" val="1339077388"/>
       </p:ext>
     </p:extLst>
   </p:cSld>
   <p:clrMapOvr>
     <a:masterClrMapping/>
   </p:clrMapOvr>
-  <p:timing>
-    <p:tnLst>
-      <p:par>
-        <p:cTn id="1" dur="indefinite" restart="never" nodeType="tmRoot"/>
-      </p:par>
-    </p:tnLst>
-  </p:timing>
 </p:sld>
 </file>
 
@@ -6525,7 +6636,7 @@
           <a:p>
             <a:r>
               <a:rPr lang="nb-NO" dirty="0" smtClean="0"/>
-              <a:t>Classes: teach me!</a:t>
+              <a:t>Yay, code!</a:t>
             </a:r>
             <a:endParaRPr lang="en-US" dirty="0"/>
           </a:p>
@@ -6547,98 +6658,43 @@
           <a:lstStyle/>
           <a:p>
             <a:r>
+              <a:rPr lang="en-US" dirty="0"/>
+              <a:t>\</a:t>
+            </a:r>
+            <a:r>
+              <a:rPr lang="en-US" dirty="0" err="1" smtClean="0"/>
+              <a:t>CheatSheet</a:t>
+            </a:r>
+            <a:r>
               <a:rPr lang="en-US" dirty="0" smtClean="0"/>
-              <a:t>Equivalent to a class in C# or Java</a:t>
-            </a:r>
-          </a:p>
-          <a:p>
-            <a:endParaRPr lang="en-US" dirty="0" smtClean="0"/>
-          </a:p>
-          <a:p>
+              <a:t>\</a:t>
+            </a:r>
+            <a:r>
+              <a:rPr lang="en-US" dirty="0" err="1" smtClean="0"/>
+              <a:t>src</a:t>
+            </a:r>
             <a:r>
               <a:rPr lang="en-US" dirty="0" smtClean="0"/>
-              <a:t>Create instances</a:t>
-            </a:r>
-          </a:p>
-          <a:p>
-            <a:endParaRPr lang="en-US" dirty="0" smtClean="0"/>
-          </a:p>
-          <a:p>
-            <a:r>
-              <a:rPr lang="en-US" dirty="0" smtClean="0"/>
-              <a:t>Call </a:t>
-            </a:r>
-            <a:r>
-              <a:rPr lang="en-US" dirty="0"/>
-              <a:t>functions on </a:t>
-            </a:r>
-            <a:r>
-              <a:rPr lang="en-US" dirty="0" smtClean="0"/>
-              <a:t>an instance</a:t>
-            </a:r>
-          </a:p>
-          <a:p>
-            <a:endParaRPr lang="en-US" dirty="0" smtClean="0"/>
-          </a:p>
-          <a:p>
-            <a:r>
-              <a:rPr lang="en-US" dirty="0" smtClean="0"/>
-              <a:t>Can </a:t>
-            </a:r>
-            <a:r>
-              <a:rPr lang="en-US" dirty="0"/>
-              <a:t>have private and public members</a:t>
-            </a:r>
-            <a:r>
-              <a:rPr lang="en-US" dirty="0" smtClean="0"/>
-              <a:t>.</a:t>
-            </a:r>
-          </a:p>
-          <a:p>
-            <a:endParaRPr lang="nb-NO" dirty="0"/>
-          </a:p>
-          <a:p>
-            <a:r>
-              <a:rPr lang="nb-NO" dirty="0" smtClean="0"/>
-              <a:t>Supports ES6 </a:t>
-            </a:r>
-            <a:r>
-              <a:rPr lang="nb-NO" dirty="0" smtClean="0">
-                <a:solidFill>
-                  <a:schemeClr val="accent2"/>
-                </a:solidFill>
-                <a:latin typeface="Consolas" panose="020B0609020204030204" pitchFamily="49" charset="0"/>
-                <a:cs typeface="Consolas" panose="020B0609020204030204" pitchFamily="49" charset="0"/>
-              </a:rPr>
-              <a:t>class</a:t>
-            </a:r>
-            <a:endParaRPr lang="en-US" dirty="0" smtClean="0">
-              <a:solidFill>
-                <a:schemeClr val="accent2"/>
-              </a:solidFill>
-              <a:latin typeface="Consolas" panose="020B0609020204030204" pitchFamily="49" charset="0"/>
-              <a:cs typeface="Consolas" panose="020B0609020204030204" pitchFamily="49" charset="0"/>
-            </a:endParaRPr>
+              <a:t>\typescript-</a:t>
+            </a:r>
+            <a:r>
+              <a:rPr lang="en-US" dirty="0" err="1" smtClean="0"/>
+              <a:t>cheatSheet.ts</a:t>
+            </a:r>
+            <a:endParaRPr lang="en-US" dirty="0"/>
           </a:p>
         </p:txBody>
       </p:sp>
     </p:spTree>
     <p:extLst>
       <p:ext uri="{BB962C8B-B14F-4D97-AF65-F5344CB8AC3E}">
-        <p14:creationId xmlns:p14="http://schemas.microsoft.com/office/powerpoint/2010/main" val="2178885088"/>
+        <p14:creationId xmlns:p14="http://schemas.microsoft.com/office/powerpoint/2010/main" val="3940602756"/>
       </p:ext>
     </p:extLst>
   </p:cSld>
   <p:clrMapOvr>
     <a:masterClrMapping/>
   </p:clrMapOvr>
-  <p:timing>
-    <p:tnLst>
-      <p:par>
-        <p:cTn id="1" dur="indefinite" restart="never" nodeType="tmRoot"/>
-      </p:par>
-    </p:tnLst>
-  </p:timing>
 </p:sld>
 </file>
 
@@ -6661,12 +6717,12 @@
       </p:grpSpPr>
       <p:sp>
         <p:nvSpPr>
-          <p:cNvPr id="2" name="Title 1"/>
-          <p:cNvSpPr>
-            <a:spLocks noGrp="1"/>
-          </p:cNvSpPr>
-          <p:nvPr>
-            <p:ph type="title"/>
+          <p:cNvPr id="4" name="Title 3"/>
+          <p:cNvSpPr>
+            <a:spLocks noGrp="1"/>
+          </p:cNvSpPr>
+          <p:nvPr>
+            <p:ph type="ctrTitle"/>
           </p:nvPr>
         </p:nvSpPr>
         <p:spPr/>
@@ -6676,48 +6732,22 @@
           <a:p>
             <a:r>
               <a:rPr lang="nb-NO" dirty="0" smtClean="0"/>
-              <a:t>Classes: show me!</a:t>
-            </a:r>
-            <a:endParaRPr lang="en-US" dirty="0"/>
-          </a:p>
-        </p:txBody>
-      </p:sp>
-      <p:sp>
-        <p:nvSpPr>
-          <p:cNvPr id="3" name="Content Placeholder 2"/>
-          <p:cNvSpPr>
-            <a:spLocks noGrp="1"/>
-          </p:cNvSpPr>
-          <p:nvPr>
-            <p:ph idx="1"/>
-          </p:nvPr>
-        </p:nvSpPr>
-        <p:spPr/>
-        <p:txBody>
-          <a:bodyPr/>
-          <a:lstStyle/>
-          <a:p>
-            <a:endParaRPr lang="en-US"/>
+              <a:t>AngularJS</a:t>
+            </a:r>
+            <a:endParaRPr lang="en-US" dirty="0"/>
           </a:p>
         </p:txBody>
       </p:sp>
     </p:spTree>
     <p:extLst>
       <p:ext uri="{BB962C8B-B14F-4D97-AF65-F5344CB8AC3E}">
-        <p14:creationId xmlns:p14="http://schemas.microsoft.com/office/powerpoint/2010/main" val="4155897361"/>
+        <p14:creationId xmlns:p14="http://schemas.microsoft.com/office/powerpoint/2010/main" val="3355743884"/>
       </p:ext>
     </p:extLst>
   </p:cSld>
   <p:clrMapOvr>
     <a:masterClrMapping/>
   </p:clrMapOvr>
-  <p:timing>
-    <p:tnLst>
-      <p:par>
-        <p:cTn id="1" dur="indefinite" restart="never" nodeType="tmRoot"/>
-      </p:par>
-    </p:tnLst>
-  </p:timing>
 </p:sld>
 </file>
 
@@ -6755,7 +6785,7 @@
           <a:p>
             <a:r>
               <a:rPr lang="nb-NO" dirty="0" smtClean="0"/>
-              <a:t>Enums: teach me!</a:t>
+              <a:t>What is it?</a:t>
             </a:r>
             <a:endParaRPr lang="en-US" dirty="0"/>
           </a:p>
@@ -6776,27 +6806,90 @@
           <a:bodyPr/>
           <a:lstStyle/>
           <a:p>
-            <a:endParaRPr lang="en-US"/>
+            <a:r>
+              <a:rPr lang="nb-NO" dirty="0" smtClean="0">
+                <a:solidFill>
+                  <a:schemeClr val="accent2"/>
+                </a:solidFill>
+              </a:rPr>
+              <a:t>S</a:t>
+            </a:r>
+            <a:r>
+              <a:rPr lang="nb-NO" dirty="0" smtClean="0"/>
+              <a:t>ingle </a:t>
+            </a:r>
+            <a:r>
+              <a:rPr lang="nb-NO" dirty="0" smtClean="0">
+                <a:solidFill>
+                  <a:schemeClr val="accent2"/>
+                </a:solidFill>
+              </a:rPr>
+              <a:t>P</a:t>
+            </a:r>
+            <a:r>
+              <a:rPr lang="nb-NO" dirty="0" smtClean="0"/>
+              <a:t>age </a:t>
+            </a:r>
+            <a:r>
+              <a:rPr lang="nb-NO" dirty="0" smtClean="0">
+                <a:solidFill>
+                  <a:schemeClr val="accent2"/>
+                </a:solidFill>
+              </a:rPr>
+              <a:t>A</a:t>
+            </a:r>
+            <a:r>
+              <a:rPr lang="nb-NO" dirty="0" smtClean="0"/>
+              <a:t>pplication</a:t>
+            </a:r>
+          </a:p>
+          <a:p>
+            <a:pPr marL="0" indent="0">
+              <a:buNone/>
+            </a:pPr>
+            <a:endParaRPr lang="nb-NO" dirty="0"/>
+          </a:p>
+          <a:p>
+            <a:r>
+              <a:rPr lang="nb-NO" dirty="0" smtClean="0"/>
+              <a:t>A web page that acts like its a single page</a:t>
+            </a:r>
+          </a:p>
+          <a:p>
+            <a:endParaRPr lang="nb-NO" dirty="0"/>
+          </a:p>
+          <a:p>
+            <a:r>
+              <a:rPr lang="nb-NO" dirty="0" smtClean="0"/>
+              <a:t>Google mail</a:t>
+            </a:r>
+          </a:p>
+          <a:p>
+            <a:endParaRPr lang="nb-NO" dirty="0"/>
+          </a:p>
+          <a:p>
+            <a:r>
+              <a:rPr lang="nb-NO" dirty="0"/>
+              <a:t>By </a:t>
+            </a:r>
+            <a:r>
+              <a:rPr lang="nb-NO" dirty="0" smtClean="0"/>
+              <a:t>Google</a:t>
+            </a:r>
+            <a:endParaRPr lang="nb-NO" dirty="0"/>
           </a:p>
         </p:txBody>
       </p:sp>
     </p:spTree>
     <p:extLst>
       <p:ext uri="{BB962C8B-B14F-4D97-AF65-F5344CB8AC3E}">
-        <p14:creationId xmlns:p14="http://schemas.microsoft.com/office/powerpoint/2010/main" val="2643523805"/>
+        <p14:creationId xmlns:p14="http://schemas.microsoft.com/office/powerpoint/2010/main" val="4013238008"/>
       </p:ext>
     </p:extLst>
   </p:cSld>
   <p:clrMapOvr>
     <a:masterClrMapping/>
   </p:clrMapOvr>
-  <p:timing>
-    <p:tnLst>
-      <p:par>
-        <p:cTn id="1" dur="indefinite" restart="never" nodeType="tmRoot"/>
-      </p:par>
-    </p:tnLst>
-  </p:timing>
 </p:sld>
 </file>
 
@@ -6833,16 +6926,8 @@
           <a:lstStyle/>
           <a:p>
             <a:r>
-              <a:rPr lang="nb-NO" dirty="0"/>
-              <a:t>Enums: </a:t>
-            </a:r>
-            <a:r>
-              <a:rPr lang="nb-NO" dirty="0" smtClean="0"/>
-              <a:t>show me</a:t>
-            </a:r>
-            <a:r>
-              <a:rPr lang="nb-NO" dirty="0"/>
-              <a:t>!</a:t>
+              <a:rPr lang="nb-NO" dirty="0" smtClean="0"/>
+              <a:t>Why should I care?</a:t>
             </a:r>
             <a:endParaRPr lang="en-US" dirty="0"/>
           </a:p>
@@ -6858,32 +6943,102 @@
             <p:ph idx="1"/>
           </p:nvPr>
         </p:nvSpPr>
-        <p:spPr/>
-        <p:txBody>
-          <a:bodyPr/>
-          <a:lstStyle/>
-          <a:p>
-            <a:endParaRPr lang="en-US"/>
+        <p:spPr>
+          <a:xfrm>
+            <a:off x="1103312" y="2052918"/>
+            <a:ext cx="8946541" cy="4195481"/>
+          </a:xfrm>
+        </p:spPr>
+        <p:txBody>
+          <a:bodyPr/>
+          <a:lstStyle/>
+          <a:p>
+            <a:r>
+              <a:rPr lang="nb-NO" dirty="0" smtClean="0"/>
+              <a:t>Separation of concerns: MVV*, </a:t>
+            </a:r>
+            <a:r>
+              <a:rPr lang="nb-NO" dirty="0" smtClean="0">
+                <a:solidFill>
+                  <a:schemeClr val="accent2"/>
+                </a:solidFill>
+              </a:rPr>
+              <a:t>models </a:t>
+            </a:r>
+            <a:r>
+              <a:rPr lang="nb-NO" dirty="0" smtClean="0"/>
+              <a:t>-</a:t>
+            </a:r>
+            <a:r>
+              <a:rPr lang="nb-NO" dirty="0" smtClean="0">
+                <a:solidFill>
+                  <a:schemeClr val="accent2"/>
+                </a:solidFill>
+              </a:rPr>
+              <a:t> views</a:t>
+            </a:r>
+            <a:r>
+              <a:rPr lang="nb-NO" dirty="0" smtClean="0"/>
+              <a:t> – </a:t>
+            </a:r>
+            <a:r>
+              <a:rPr lang="nb-NO" dirty="0" smtClean="0">
+                <a:solidFill>
+                  <a:schemeClr val="accent2"/>
+                </a:solidFill>
+              </a:rPr>
+              <a:t>controllers</a:t>
+            </a:r>
+          </a:p>
+          <a:p>
+            <a:pPr lvl="1"/>
+            <a:r>
+              <a:rPr lang="nb-NO" dirty="0" smtClean="0"/>
+              <a:t>Separates the javascript from html</a:t>
+            </a:r>
+          </a:p>
+          <a:p>
+            <a:pPr marL="457200" lvl="1" indent="0">
+              <a:buNone/>
+            </a:pPr>
+            <a:endParaRPr lang="nb-NO" dirty="0" smtClean="0">
+              <a:solidFill>
+                <a:schemeClr val="accent2"/>
+              </a:solidFill>
+            </a:endParaRPr>
+          </a:p>
+          <a:p>
+            <a:r>
+              <a:rPr lang="nb-NO" dirty="0" smtClean="0"/>
+              <a:t>Dependency injection and testability</a:t>
+            </a:r>
+          </a:p>
+          <a:p>
+            <a:endParaRPr lang="nb-NO" dirty="0">
+              <a:solidFill>
+                <a:schemeClr val="accent2"/>
+              </a:solidFill>
+            </a:endParaRPr>
+          </a:p>
+          <a:p>
+            <a:r>
+              <a:rPr lang="nb-NO" dirty="0" smtClean="0"/>
+              <a:t>Directives, async promises, two-way model binding</a:t>
+            </a:r>
+            <a:endParaRPr lang="nb-NO" dirty="0"/>
           </a:p>
         </p:txBody>
       </p:sp>
     </p:spTree>
     <p:extLst>
       <p:ext uri="{BB962C8B-B14F-4D97-AF65-F5344CB8AC3E}">
-        <p14:creationId xmlns:p14="http://schemas.microsoft.com/office/powerpoint/2010/main" val="1889000198"/>
+        <p14:creationId xmlns:p14="http://schemas.microsoft.com/office/powerpoint/2010/main" val="2890827627"/>
       </p:ext>
     </p:extLst>
   </p:cSld>
   <p:clrMapOvr>
     <a:masterClrMapping/>
   </p:clrMapOvr>
-  <p:timing>
-    <p:tnLst>
-      <p:par>
-        <p:cTn id="1" dur="indefinite" restart="never" nodeType="tmRoot"/>
-      </p:par>
-    </p:tnLst>
-  </p:timing>
 </p:sld>
 </file>
 
@@ -6921,7 +7076,7 @@
           <a:p>
             <a:r>
               <a:rPr lang="nb-NO" dirty="0" smtClean="0"/>
-              <a:t>Interfaces: teach me!</a:t>
+              <a:t>When should I use it?</a:t>
             </a:r>
             <a:endParaRPr lang="en-US" dirty="0"/>
           </a:p>
@@ -6942,27 +7097,51 @@
           <a:bodyPr/>
           <a:lstStyle/>
           <a:p>
-            <a:endParaRPr lang="en-US"/>
+            <a:r>
+              <a:rPr lang="nb-NO" dirty="0" smtClean="0"/>
+              <a:t>It’s a framework for building a full-size SPA</a:t>
+            </a:r>
+          </a:p>
+          <a:p>
+            <a:endParaRPr lang="nb-NO" dirty="0"/>
+          </a:p>
+          <a:p>
+            <a:r>
+              <a:rPr lang="nb-NO" dirty="0" smtClean="0"/>
+              <a:t>Use it if you’re building a full SPA site.</a:t>
+            </a:r>
+          </a:p>
+          <a:p>
+            <a:endParaRPr lang="nb-NO" dirty="0"/>
+          </a:p>
+          <a:p>
+            <a:r>
+              <a:rPr lang="nb-NO" dirty="0" smtClean="0"/>
+              <a:t>Other, great libraries for two-way binding and async promises.</a:t>
+            </a:r>
+          </a:p>
+          <a:p>
+            <a:endParaRPr lang="nb-NO" dirty="0"/>
+          </a:p>
+          <a:p>
+            <a:r>
+              <a:rPr lang="nb-NO" dirty="0" smtClean="0"/>
+              <a:t>Taking dependency on Angular for just a fraction of its features is unnecessary</a:t>
+            </a:r>
+            <a:endParaRPr lang="en-US" dirty="0"/>
           </a:p>
         </p:txBody>
       </p:sp>
     </p:spTree>
     <p:extLst>
       <p:ext uri="{BB962C8B-B14F-4D97-AF65-F5344CB8AC3E}">
-        <p14:creationId xmlns:p14="http://schemas.microsoft.com/office/powerpoint/2010/main" val="91867041"/>
+        <p14:creationId xmlns:p14="http://schemas.microsoft.com/office/powerpoint/2010/main" val="1818193889"/>
       </p:ext>
     </p:extLst>
   </p:cSld>
   <p:clrMapOvr>
     <a:masterClrMapping/>
   </p:clrMapOvr>
-  <p:timing>
-    <p:tnLst>
-      <p:par>
-        <p:cTn id="1" dur="indefinite" restart="never" nodeType="tmRoot"/>
-      </p:par>
-    </p:tnLst>
-  </p:timing>
 </p:sld>
 </file>
 
@@ -6999,16 +7178,8 @@
           <a:lstStyle/>
           <a:p>
             <a:r>
-              <a:rPr lang="nb-NO" dirty="0"/>
-              <a:t>Interfaces: </a:t>
-            </a:r>
-            <a:r>
-              <a:rPr lang="nb-NO" dirty="0" smtClean="0"/>
-              <a:t>show me</a:t>
-            </a:r>
-            <a:r>
-              <a:rPr lang="nb-NO" dirty="0"/>
-              <a:t>!</a:t>
+              <a:rPr lang="nb-NO" dirty="0" smtClean="0"/>
+              <a:t>More code please!</a:t>
             </a:r>
             <a:endParaRPr lang="en-US" dirty="0"/>
           </a:p>
@@ -7029,27 +7200,58 @@
           <a:bodyPr/>
           <a:lstStyle/>
           <a:p>
-            <a:endParaRPr lang="en-US"/>
+            <a:r>
+              <a:rPr lang="en-US" dirty="0"/>
+              <a:t>\</a:t>
+            </a:r>
+            <a:r>
+              <a:rPr lang="en-US" dirty="0" err="1" smtClean="0"/>
+              <a:t>CheatSheet</a:t>
+            </a:r>
+            <a:r>
+              <a:rPr lang="en-US" dirty="0" smtClean="0"/>
+              <a:t>\</a:t>
+            </a:r>
+            <a:r>
+              <a:rPr lang="en-US" dirty="0" err="1" smtClean="0"/>
+              <a:t>src</a:t>
+            </a:r>
+            <a:r>
+              <a:rPr lang="en-US" dirty="0" smtClean="0"/>
+              <a:t>\</a:t>
+            </a:r>
+            <a:r>
+              <a:rPr lang="en-US" dirty="0" err="1" smtClean="0"/>
+              <a:t>angularjs-cheatSheet.ts</a:t>
+            </a:r>
+            <a:r>
+              <a:rPr lang="en-US" dirty="0"/>
+              <a:t> </a:t>
+            </a:r>
+            <a:endParaRPr lang="en-US" dirty="0" smtClean="0"/>
+          </a:p>
+          <a:p>
+            <a:endParaRPr lang="en-US" dirty="0"/>
+          </a:p>
+          <a:p>
+            <a:r>
+              <a:rPr lang="nb-NO" dirty="0" smtClean="0"/>
+              <a:t>(plain java script)</a:t>
+            </a:r>
+            <a:endParaRPr lang="en-US" dirty="0"/>
           </a:p>
         </p:txBody>
       </p:sp>
     </p:spTree>
     <p:extLst>
       <p:ext uri="{BB962C8B-B14F-4D97-AF65-F5344CB8AC3E}">
-        <p14:creationId xmlns:p14="http://schemas.microsoft.com/office/powerpoint/2010/main" val="3106916158"/>
+        <p14:creationId xmlns:p14="http://schemas.microsoft.com/office/powerpoint/2010/main" val="1065768177"/>
       </p:ext>
     </p:extLst>
   </p:cSld>
   <p:clrMapOvr>
     <a:masterClrMapping/>
   </p:clrMapOvr>
-  <p:timing>
-    <p:tnLst>
-      <p:par>
-        <p:cTn id="1" dur="indefinite" restart="never" nodeType="tmRoot"/>
-      </p:par>
-    </p:tnLst>
-  </p:timing>
 </p:sld>
 </file>
 
@@ -7128,15 +7330,7 @@
           <a:p>
             <a:r>
               <a:rPr lang="nb-NO" dirty="0" smtClean="0"/>
-              <a:t>Supports any </a:t>
-            </a:r>
-            <a:r>
-              <a:rPr lang="nb-NO" dirty="0" smtClean="0"/>
-              <a:t>ES3 to ES6-compatible </a:t>
-            </a:r>
-            <a:r>
-              <a:rPr lang="nb-NO" dirty="0" smtClean="0"/>
-              <a:t>environment</a:t>
+              <a:t>Supports any ES3 to ES6-compatible environment</a:t>
             </a:r>
           </a:p>
         </p:txBody>
@@ -7180,12 +7374,12 @@
       </p:grpSpPr>
       <p:sp>
         <p:nvSpPr>
-          <p:cNvPr id="2" name="Title 1"/>
-          <p:cNvSpPr>
-            <a:spLocks noGrp="1"/>
-          </p:cNvSpPr>
-          <p:nvPr>
-            <p:ph type="title"/>
+          <p:cNvPr id="4" name="Title 3"/>
+          <p:cNvSpPr>
+            <a:spLocks noGrp="1"/>
+          </p:cNvSpPr>
+          <p:nvPr>
+            <p:ph type="ctrTitle"/>
           </p:nvPr>
         </p:nvSpPr>
         <p:spPr/>
@@ -7195,48 +7389,22 @@
           <a:p>
             <a:r>
               <a:rPr lang="nb-NO" dirty="0" smtClean="0"/>
-              <a:t>Generics: teach me!</a:t>
-            </a:r>
-            <a:endParaRPr lang="en-US" dirty="0"/>
-          </a:p>
-        </p:txBody>
-      </p:sp>
-      <p:sp>
-        <p:nvSpPr>
-          <p:cNvPr id="3" name="Content Placeholder 2"/>
-          <p:cNvSpPr>
-            <a:spLocks noGrp="1"/>
-          </p:cNvSpPr>
-          <p:nvPr>
-            <p:ph idx="1"/>
-          </p:nvPr>
-        </p:nvSpPr>
-        <p:spPr/>
-        <p:txBody>
-          <a:bodyPr/>
-          <a:lstStyle/>
-          <a:p>
-            <a:endParaRPr lang="en-US"/>
+              <a:t>LibraryApp</a:t>
+            </a:r>
+            <a:endParaRPr lang="en-US" dirty="0"/>
           </a:p>
         </p:txBody>
       </p:sp>
     </p:spTree>
     <p:extLst>
       <p:ext uri="{BB962C8B-B14F-4D97-AF65-F5344CB8AC3E}">
-        <p14:creationId xmlns:p14="http://schemas.microsoft.com/office/powerpoint/2010/main" val="1108068101"/>
+        <p14:creationId xmlns:p14="http://schemas.microsoft.com/office/powerpoint/2010/main" val="2648748397"/>
       </p:ext>
     </p:extLst>
   </p:cSld>
   <p:clrMapOvr>
     <a:masterClrMapping/>
   </p:clrMapOvr>
-  <p:timing>
-    <p:tnLst>
-      <p:par>
-        <p:cTn id="1" dur="indefinite" restart="never" nodeType="tmRoot"/>
-      </p:par>
-    </p:tnLst>
-  </p:timing>
 </p:sld>
 </file>
 
@@ -7274,7 +7442,7 @@
           <a:p>
             <a:r>
               <a:rPr lang="nb-NO" dirty="0" smtClean="0"/>
-              <a:t>Generics: show me!</a:t>
+              <a:t>The domain</a:t>
             </a:r>
             <a:endParaRPr lang="en-US" dirty="0"/>
           </a:p>
@@ -7295,27 +7463,61 @@
           <a:bodyPr/>
           <a:lstStyle/>
           <a:p>
-            <a:endParaRPr lang="en-US"/>
+            <a:r>
+              <a:rPr lang="nb-NO" dirty="0" smtClean="0"/>
+              <a:t>Simple web application for a library</a:t>
+            </a:r>
+          </a:p>
+          <a:p>
+            <a:endParaRPr lang="nb-NO" dirty="0"/>
+          </a:p>
+          <a:p>
+            <a:r>
+              <a:rPr lang="nb-NO" dirty="0" smtClean="0"/>
+              <a:t>Basic functions:</a:t>
+            </a:r>
+          </a:p>
+          <a:p>
+            <a:pPr lvl="1"/>
+            <a:r>
+              <a:rPr lang="nb-NO" dirty="0" smtClean="0"/>
+              <a:t>Search for books</a:t>
+            </a:r>
+          </a:p>
+          <a:p>
+            <a:pPr lvl="1"/>
+            <a:r>
+              <a:rPr lang="nb-NO" dirty="0" smtClean="0"/>
+              <a:t>Rent a book</a:t>
+            </a:r>
+          </a:p>
+          <a:p>
+            <a:pPr lvl="1"/>
+            <a:r>
+              <a:rPr lang="nb-NO" dirty="0" smtClean="0"/>
+              <a:t>Deposit a book</a:t>
+            </a:r>
+          </a:p>
+          <a:p>
+            <a:pPr lvl="1"/>
+            <a:r>
+              <a:rPr lang="nb-NO" dirty="0" smtClean="0"/>
+              <a:t>See status for a rented book</a:t>
+            </a:r>
+            <a:endParaRPr lang="en-US" dirty="0"/>
           </a:p>
         </p:txBody>
       </p:sp>
     </p:spTree>
     <p:extLst>
       <p:ext uri="{BB962C8B-B14F-4D97-AF65-F5344CB8AC3E}">
-        <p14:creationId xmlns:p14="http://schemas.microsoft.com/office/powerpoint/2010/main" val="1124729720"/>
+        <p14:creationId xmlns:p14="http://schemas.microsoft.com/office/powerpoint/2010/main" val="3579510660"/>
       </p:ext>
     </p:extLst>
   </p:cSld>
   <p:clrMapOvr>
     <a:masterClrMapping/>
   </p:clrMapOvr>
-  <p:timing>
-    <p:tnLst>
-      <p:par>
-        <p:cTn id="1" dur="indefinite" restart="never" nodeType="tmRoot"/>
-      </p:par>
-    </p:tnLst>
-  </p:timing>
 </p:sld>
 </file>
 
@@ -7353,7 +7555,7 @@
           <a:p>
             <a:r>
               <a:rPr lang="nb-NO" dirty="0" smtClean="0"/>
-              <a:t>Lambdas: teach me!</a:t>
+              <a:t>Your options</a:t>
             </a:r>
             <a:endParaRPr lang="en-US" dirty="0"/>
           </a:p>
@@ -7374,27 +7576,94 @@
           <a:bodyPr/>
           <a:lstStyle/>
           <a:p>
-            <a:endParaRPr lang="en-US"/>
+            <a:r>
+              <a:rPr lang="nb-NO" dirty="0" smtClean="0"/>
+              <a:t>Work with the </a:t>
+            </a:r>
+            <a:r>
+              <a:rPr lang="nb-NO" b="1" dirty="0" smtClean="0">
+                <a:solidFill>
+                  <a:schemeClr val="accent2"/>
+                </a:solidFill>
+              </a:rPr>
+              <a:t>C#</a:t>
+            </a:r>
+            <a:r>
+              <a:rPr lang="nb-NO" dirty="0" smtClean="0"/>
+              <a:t> solution</a:t>
+            </a:r>
+          </a:p>
+          <a:p>
+            <a:endParaRPr lang="nb-NO" dirty="0"/>
+          </a:p>
+          <a:p>
+            <a:r>
+              <a:rPr lang="nb-NO" dirty="0" smtClean="0"/>
+              <a:t>Work with the </a:t>
+            </a:r>
+            <a:r>
+              <a:rPr lang="nb-NO" b="1" dirty="0" smtClean="0">
+                <a:solidFill>
+                  <a:schemeClr val="accent2"/>
+                </a:solidFill>
+              </a:rPr>
+              <a:t>Java</a:t>
+            </a:r>
+            <a:r>
+              <a:rPr lang="nb-NO" dirty="0" smtClean="0">
+                <a:solidFill>
+                  <a:schemeClr val="accent2"/>
+                </a:solidFill>
+              </a:rPr>
+              <a:t> </a:t>
+            </a:r>
+            <a:r>
+              <a:rPr lang="nb-NO" dirty="0" smtClean="0"/>
+              <a:t>solution</a:t>
+            </a:r>
+          </a:p>
+          <a:p>
+            <a:endParaRPr lang="nb-NO" dirty="0"/>
+          </a:p>
+          <a:p>
+            <a:r>
+              <a:rPr lang="nb-NO" dirty="0" smtClean="0"/>
+              <a:t>Work with the </a:t>
+            </a:r>
+            <a:r>
+              <a:rPr lang="nb-NO" b="1" dirty="0" smtClean="0">
+                <a:solidFill>
+                  <a:schemeClr val="accent2"/>
+                </a:solidFill>
+              </a:rPr>
+              <a:t>nodejs</a:t>
+            </a:r>
+            <a:r>
+              <a:rPr lang="nb-NO" dirty="0" smtClean="0">
+                <a:solidFill>
+                  <a:schemeClr val="accent2"/>
+                </a:solidFill>
+              </a:rPr>
+              <a:t> </a:t>
+            </a:r>
+            <a:r>
+              <a:rPr lang="nb-NO" dirty="0" smtClean="0"/>
+              <a:t>solution</a:t>
+            </a:r>
+            <a:endParaRPr lang="en-US" dirty="0"/>
           </a:p>
         </p:txBody>
       </p:sp>
     </p:spTree>
     <p:extLst>
       <p:ext uri="{BB962C8B-B14F-4D97-AF65-F5344CB8AC3E}">
-        <p14:creationId xmlns:p14="http://schemas.microsoft.com/office/powerpoint/2010/main" val="1455187792"/>
+        <p14:creationId xmlns:p14="http://schemas.microsoft.com/office/powerpoint/2010/main" val="4237134668"/>
       </p:ext>
     </p:extLst>
   </p:cSld>
   <p:clrMapOvr>
     <a:masterClrMapping/>
   </p:clrMapOvr>
-  <p:timing>
-    <p:tnLst>
-      <p:par>
-        <p:cTn id="1" dur="indefinite" restart="never" nodeType="tmRoot"/>
-      </p:par>
-    </p:tnLst>
-  </p:timing>
 </p:sld>
 </file>
 
@@ -7431,16 +7700,8 @@
           <a:lstStyle/>
           <a:p>
             <a:r>
-              <a:rPr lang="nb-NO" dirty="0"/>
-              <a:t>Lambdas: </a:t>
-            </a:r>
-            <a:r>
-              <a:rPr lang="nb-NO" dirty="0" smtClean="0"/>
-              <a:t>show me</a:t>
-            </a:r>
-            <a:r>
-              <a:rPr lang="nb-NO" dirty="0"/>
-              <a:t>!</a:t>
+              <a:rPr lang="nb-NO" dirty="0" smtClean="0"/>
+              <a:t>Out of the box for all solutions</a:t>
             </a:r>
             <a:endParaRPr lang="en-US" dirty="0"/>
           </a:p>
@@ -7461,27 +7722,114 @@
           <a:bodyPr/>
           <a:lstStyle/>
           <a:p>
-            <a:endParaRPr lang="en-US"/>
+            <a:r>
+              <a:rPr lang="nb-NO" dirty="0" smtClean="0"/>
+              <a:t>AngularJS is wired with:</a:t>
+            </a:r>
+          </a:p>
+          <a:p>
+            <a:pPr lvl="1"/>
+            <a:r>
+              <a:rPr lang="nb-NO" dirty="0" smtClean="0">
+                <a:solidFill>
+                  <a:schemeClr val="accent2"/>
+                </a:solidFill>
+              </a:rPr>
+              <a:t>Routing</a:t>
+            </a:r>
+          </a:p>
+          <a:p>
+            <a:pPr lvl="1"/>
+            <a:r>
+              <a:rPr lang="nb-NO" dirty="0" smtClean="0"/>
+              <a:t>A </a:t>
+            </a:r>
+            <a:r>
+              <a:rPr lang="nb-NO" dirty="0" smtClean="0">
+                <a:solidFill>
+                  <a:schemeClr val="accent2"/>
+                </a:solidFill>
+              </a:rPr>
+              <a:t>directive</a:t>
+            </a:r>
+          </a:p>
+          <a:p>
+            <a:pPr lvl="1"/>
+            <a:r>
+              <a:rPr lang="nb-NO" dirty="0" smtClean="0"/>
+              <a:t>A </a:t>
+            </a:r>
+            <a:r>
+              <a:rPr lang="nb-NO" dirty="0" smtClean="0">
+                <a:solidFill>
+                  <a:schemeClr val="accent2"/>
+                </a:solidFill>
+              </a:rPr>
+              <a:t>service</a:t>
+            </a:r>
+          </a:p>
+          <a:p>
+            <a:pPr lvl="1"/>
+            <a:r>
+              <a:rPr lang="nb-NO" dirty="0" smtClean="0">
+                <a:solidFill>
+                  <a:schemeClr val="accent2"/>
+                </a:solidFill>
+              </a:rPr>
+              <a:t>Views</a:t>
+            </a:r>
+            <a:r>
+              <a:rPr lang="nb-NO" dirty="0" smtClean="0"/>
+              <a:t> with </a:t>
+            </a:r>
+            <a:r>
+              <a:rPr lang="nb-NO" dirty="0" smtClean="0">
+                <a:solidFill>
+                  <a:schemeClr val="accent2"/>
+                </a:solidFill>
+              </a:rPr>
+              <a:t>controllers</a:t>
+            </a:r>
+          </a:p>
+          <a:p>
+            <a:pPr lvl="1"/>
+            <a:endParaRPr lang="nb-NO" dirty="0" smtClean="0">
+              <a:solidFill>
+                <a:schemeClr val="accent2"/>
+              </a:solidFill>
+            </a:endParaRPr>
+          </a:p>
+          <a:p>
+            <a:r>
+              <a:rPr lang="nb-NO" dirty="0" smtClean="0"/>
+              <a:t>The </a:t>
+            </a:r>
+            <a:r>
+              <a:rPr lang="nb-NO" dirty="0" smtClean="0">
+                <a:solidFill>
+                  <a:schemeClr val="accent2"/>
+                </a:solidFill>
+              </a:rPr>
+              <a:t>search for books </a:t>
+            </a:r>
+            <a:r>
+              <a:rPr lang="nb-NO" dirty="0" smtClean="0"/>
+              <a:t>feature is implemented for reference</a:t>
+            </a:r>
+            <a:endParaRPr lang="en-US" dirty="0"/>
           </a:p>
         </p:txBody>
       </p:sp>
     </p:spTree>
     <p:extLst>
       <p:ext uri="{BB962C8B-B14F-4D97-AF65-F5344CB8AC3E}">
-        <p14:creationId xmlns:p14="http://schemas.microsoft.com/office/powerpoint/2010/main" val="1485658168"/>
+        <p14:creationId xmlns:p14="http://schemas.microsoft.com/office/powerpoint/2010/main" val="666392007"/>
       </p:ext>
     </p:extLst>
   </p:cSld>
   <p:clrMapOvr>
     <a:masterClrMapping/>
   </p:clrMapOvr>
-  <p:timing>
-    <p:tnLst>
-      <p:par>
-        <p:cTn id="1" dur="indefinite" restart="never" nodeType="tmRoot"/>
-      </p:par>
-    </p:tnLst>
-  </p:timing>
 </p:sld>
 </file>
 
@@ -7517,7 +7865,11 @@
           <a:bodyPr/>
           <a:lstStyle/>
           <a:p>
-            <a:endParaRPr lang="en-US"/>
+            <a:r>
+              <a:rPr lang="nb-NO" dirty="0" smtClean="0"/>
+              <a:t>The backend</a:t>
+            </a:r>
+            <a:endParaRPr lang="en-US" dirty="0"/>
           </a:p>
         </p:txBody>
       </p:sp>
@@ -7536,27 +7888,41 @@
           <a:bodyPr/>
           <a:lstStyle/>
           <a:p>
-            <a:endParaRPr lang="en-US"/>
+            <a:r>
+              <a:rPr lang="nb-NO" dirty="0" smtClean="0"/>
+              <a:t>Don’t worry about it!</a:t>
+            </a:r>
+          </a:p>
+          <a:p>
+            <a:endParaRPr lang="nb-NO" dirty="0"/>
+          </a:p>
+          <a:p>
+            <a:r>
+              <a:rPr lang="nb-NO" dirty="0" smtClean="0"/>
+              <a:t>http</a:t>
+            </a:r>
+            <a:r>
+              <a:rPr lang="nb-NO" dirty="0"/>
+              <a:t>://</a:t>
+            </a:r>
+            <a:r>
+              <a:rPr lang="nb-NO" dirty="0" smtClean="0"/>
+              <a:t>openmockapi.azurewebsites.net/library</a:t>
+            </a:r>
+            <a:endParaRPr lang="en-US" dirty="0"/>
           </a:p>
         </p:txBody>
       </p:sp>
     </p:spTree>
     <p:extLst>
       <p:ext uri="{BB962C8B-B14F-4D97-AF65-F5344CB8AC3E}">
-        <p14:creationId xmlns:p14="http://schemas.microsoft.com/office/powerpoint/2010/main" val="1192381376"/>
+        <p14:creationId xmlns:p14="http://schemas.microsoft.com/office/powerpoint/2010/main" val="3764434964"/>
       </p:ext>
     </p:extLst>
   </p:cSld>
   <p:clrMapOvr>
     <a:masterClrMapping/>
   </p:clrMapOvr>
-  <p:timing>
-    <p:tnLst>
-      <p:par>
-        <p:cTn id="1" dur="indefinite" restart="never" nodeType="tmRoot"/>
-      </p:par>
-    </p:tnLst>
-  </p:timing>
 </p:sld>
 </file>
 
@@ -7594,7 +7960,7 @@
           <a:p>
             <a:r>
               <a:rPr lang="nb-NO" dirty="0" smtClean="0"/>
-              <a:t>LibraryApp: </a:t>
+              <a:t>Optional: gulp &amp; node</a:t>
             </a:r>
             <a:endParaRPr lang="en-US" dirty="0"/>
           </a:p>
@@ -7615,27 +7981,99 @@
           <a:bodyPr/>
           <a:lstStyle/>
           <a:p>
-            <a:endParaRPr lang="en-US"/>
+            <a:r>
+              <a:rPr lang="nb-NO" dirty="0" smtClean="0"/>
+              <a:t>The </a:t>
+            </a:r>
+            <a:r>
+              <a:rPr lang="nb-NO" b="1" dirty="0" smtClean="0"/>
+              <a:t>automation framework </a:t>
+            </a:r>
+            <a:r>
+              <a:rPr lang="nb-NO" dirty="0" smtClean="0">
+                <a:solidFill>
+                  <a:schemeClr val="accent2"/>
+                </a:solidFill>
+              </a:rPr>
+              <a:t>gulp</a:t>
+            </a:r>
+            <a:r>
+              <a:rPr lang="nb-NO" dirty="0" smtClean="0"/>
+              <a:t> is present for all solutions</a:t>
+            </a:r>
+          </a:p>
+          <a:p>
+            <a:endParaRPr lang="nb-NO" dirty="0" smtClean="0"/>
+          </a:p>
+          <a:p>
+            <a:r>
+              <a:rPr lang="nb-NO" dirty="0" smtClean="0"/>
+              <a:t>The default </a:t>
+            </a:r>
+            <a:r>
+              <a:rPr lang="nb-NO" dirty="0" smtClean="0">
+                <a:solidFill>
+                  <a:schemeClr val="accent2"/>
+                </a:solidFill>
+              </a:rPr>
+              <a:t>gulp</a:t>
+            </a:r>
+            <a:r>
+              <a:rPr lang="nb-NO" dirty="0" smtClean="0"/>
+              <a:t> command will rebuild all .ts files</a:t>
+            </a:r>
+          </a:p>
+          <a:p>
+            <a:r>
+              <a:rPr lang="nb-NO" dirty="0" smtClean="0"/>
+              <a:t>The </a:t>
+            </a:r>
+            <a:r>
+              <a:rPr lang="nb-NO" dirty="0" smtClean="0">
+                <a:solidFill>
+                  <a:schemeClr val="accent2"/>
+                </a:solidFill>
+              </a:rPr>
+              <a:t>gulp watch </a:t>
+            </a:r>
+            <a:r>
+              <a:rPr lang="nb-NO" dirty="0" smtClean="0"/>
+              <a:t>command will watch for, and build on changes</a:t>
+            </a:r>
+            <a:endParaRPr lang="nb-NO" dirty="0"/>
+          </a:p>
+          <a:p>
+            <a:endParaRPr lang="nb-NO" dirty="0" smtClean="0"/>
+          </a:p>
+          <a:p>
+            <a:r>
+              <a:rPr lang="nb-NO" dirty="0" smtClean="0"/>
+              <a:t>Readme.txt </a:t>
+            </a:r>
+            <a:endParaRPr lang="nb-NO" dirty="0"/>
+          </a:p>
+          <a:p>
+            <a:endParaRPr lang="nb-NO" dirty="0"/>
+          </a:p>
+          <a:p>
+            <a:r>
+              <a:rPr lang="nb-NO" dirty="0" smtClean="0"/>
+              <a:t>Explore the gulpfile.js</a:t>
+            </a:r>
+            <a:endParaRPr lang="en-US" dirty="0"/>
           </a:p>
         </p:txBody>
       </p:sp>
     </p:spTree>
     <p:extLst>
       <p:ext uri="{BB962C8B-B14F-4D97-AF65-F5344CB8AC3E}">
-        <p14:creationId xmlns:p14="http://schemas.microsoft.com/office/powerpoint/2010/main" val="3937059755"/>
+        <p14:creationId xmlns:p14="http://schemas.microsoft.com/office/powerpoint/2010/main" val="3394789111"/>
       </p:ext>
     </p:extLst>
   </p:cSld>
   <p:clrMapOvr>
     <a:masterClrMapping/>
   </p:clrMapOvr>
-  <p:timing>
-    <p:tnLst>
-      <p:par>
-        <p:cTn id="1" dur="indefinite" restart="never" nodeType="tmRoot"/>
-      </p:par>
-    </p:tnLst>
-  </p:timing>
 </p:sld>
 </file>
 
@@ -7658,12 +8096,12 @@
       </p:grpSpPr>
       <p:sp>
         <p:nvSpPr>
-          <p:cNvPr id="4" name="Title 3"/>
-          <p:cNvSpPr>
-            <a:spLocks noGrp="1"/>
-          </p:cNvSpPr>
-          <p:nvPr>
-            <p:ph type="ctrTitle"/>
+          <p:cNvPr id="2" name="Title 1"/>
+          <p:cNvSpPr>
+            <a:spLocks noGrp="1"/>
+          </p:cNvSpPr>
+          <p:nvPr>
+            <p:ph type="title"/>
           </p:nvPr>
         </p:nvSpPr>
         <p:spPr/>
@@ -7673,50 +8111,20 @@
           <a:p>
             <a:r>
               <a:rPr lang="nb-NO" dirty="0" smtClean="0"/>
-              <a:t>LibraryApp</a:t>
-            </a:r>
-            <a:endParaRPr lang="en-US" dirty="0"/>
-          </a:p>
-        </p:txBody>
-      </p:sp>
-    </p:spTree>
-    <p:extLst>
-      <p:ext uri="{BB962C8B-B14F-4D97-AF65-F5344CB8AC3E}">
-        <p14:creationId xmlns:p14="http://schemas.microsoft.com/office/powerpoint/2010/main" val="2648748397"/>
-      </p:ext>
-    </p:extLst>
-  </p:cSld>
-  <p:clrMapOvr>
-    <a:masterClrMapping/>
-  </p:clrMapOvr>
-</p:sld>
-</file>
-
-<file path=ppt/slides/slide27.xml><?xml version="1.0" encoding="utf-8"?>
-<p:sld xmlns:a="http://schemas.openxmlformats.org/drawingml/2006/main" xmlns:r="http://schemas.openxmlformats.org/officeDocument/2006/relationships" xmlns:p="http://schemas.openxmlformats.org/presentationml/2006/main">
-  <p:cSld>
-    <p:spTree>
-      <p:nvGrpSpPr>
-        <p:cNvPr id="1" name=""/>
-        <p:cNvGrpSpPr/>
-        <p:nvPr/>
-      </p:nvGrpSpPr>
-      <p:grpSpPr>
-        <a:xfrm>
-          <a:off x="0" y="0"/>
-          <a:ext cx="0" cy="0"/>
-          <a:chOff x="0" y="0"/>
-          <a:chExt cx="0" cy="0"/>
-        </a:xfrm>
-      </p:grpSpPr>
-      <p:sp>
-        <p:nvSpPr>
-          <p:cNvPr id="2" name="Title 1"/>
-          <p:cNvSpPr>
-            <a:spLocks noGrp="1"/>
-          </p:cNvSpPr>
-          <p:nvPr>
-            <p:ph type="title"/>
+              <a:t>Show me the code</a:t>
+            </a:r>
+            <a:endParaRPr lang="en-US" dirty="0"/>
+          </a:p>
+        </p:txBody>
+      </p:sp>
+      <p:sp>
+        <p:nvSpPr>
+          <p:cNvPr id="3" name="Content Placeholder 2"/>
+          <p:cNvSpPr>
+            <a:spLocks noGrp="1"/>
+          </p:cNvSpPr>
+          <p:nvPr>
+            <p:ph idx="1"/>
           </p:nvPr>
         </p:nvSpPr>
         <p:spPr/>
@@ -7725,144 +8133,44 @@
           <a:lstStyle/>
           <a:p>
             <a:r>
-              <a:rPr lang="nb-NO" dirty="0" smtClean="0"/>
-              <a:t>The domain</a:t>
-            </a:r>
-            <a:endParaRPr lang="en-US" dirty="0"/>
-          </a:p>
-        </p:txBody>
-      </p:sp>
-      <p:sp>
-        <p:nvSpPr>
-          <p:cNvPr id="3" name="Content Placeholder 2"/>
-          <p:cNvSpPr>
-            <a:spLocks noGrp="1"/>
-          </p:cNvSpPr>
-          <p:nvPr>
-            <p:ph idx="1"/>
-          </p:nvPr>
-        </p:nvSpPr>
-        <p:spPr/>
-        <p:txBody>
-          <a:bodyPr/>
-          <a:lstStyle/>
-          <a:p>
-            <a:r>
-              <a:rPr lang="nb-NO" dirty="0" smtClean="0"/>
-              <a:t>Simple web application for a library</a:t>
-            </a:r>
-          </a:p>
-          <a:p>
-            <a:endParaRPr lang="nb-NO" dirty="0"/>
-          </a:p>
-          <a:p>
-            <a:r>
-              <a:rPr lang="nb-NO" dirty="0" smtClean="0"/>
-              <a:t>Basic functions:</a:t>
-            </a:r>
-          </a:p>
-          <a:p>
-            <a:pPr lvl="1"/>
-            <a:r>
-              <a:rPr lang="nb-NO" dirty="0" smtClean="0"/>
-              <a:t>Search for books</a:t>
-            </a:r>
-          </a:p>
-          <a:p>
-            <a:pPr lvl="1"/>
-            <a:r>
-              <a:rPr lang="nb-NO" dirty="0" smtClean="0"/>
-              <a:t>Rent a book</a:t>
-            </a:r>
-          </a:p>
-          <a:p>
-            <a:pPr lvl="1"/>
-            <a:r>
-              <a:rPr lang="nb-NO" dirty="0" smtClean="0"/>
-              <a:t>Deposit a book</a:t>
-            </a:r>
-          </a:p>
-          <a:p>
-            <a:pPr lvl="1"/>
-            <a:r>
-              <a:rPr lang="nb-NO" dirty="0" smtClean="0"/>
-              <a:t>See status for a rented book</a:t>
-            </a:r>
-            <a:endParaRPr lang="en-US" dirty="0"/>
-          </a:p>
-        </p:txBody>
-      </p:sp>
-    </p:spTree>
-    <p:extLst>
-      <p:ext uri="{BB962C8B-B14F-4D97-AF65-F5344CB8AC3E}">
-        <p14:creationId xmlns:p14="http://schemas.microsoft.com/office/powerpoint/2010/main" val="3579510660"/>
-      </p:ext>
-    </p:extLst>
-  </p:cSld>
-  <p:clrMapOvr>
-    <a:masterClrMapping/>
-  </p:clrMapOvr>
-</p:sld>
-</file>
-
-<file path=ppt/slides/slide28.xml><?xml version="1.0" encoding="utf-8"?>
-<p:sld xmlns:a="http://schemas.openxmlformats.org/drawingml/2006/main" xmlns:r="http://schemas.openxmlformats.org/officeDocument/2006/relationships" xmlns:p="http://schemas.openxmlformats.org/presentationml/2006/main">
-  <p:cSld>
-    <p:spTree>
-      <p:nvGrpSpPr>
-        <p:cNvPr id="1" name=""/>
-        <p:cNvGrpSpPr/>
-        <p:nvPr/>
-      </p:nvGrpSpPr>
-      <p:grpSpPr>
-        <a:xfrm>
-          <a:off x="0" y="0"/>
-          <a:ext cx="0" cy="0"/>
-          <a:chOff x="0" y="0"/>
-          <a:chExt cx="0" cy="0"/>
-        </a:xfrm>
-      </p:grpSpPr>
-      <p:sp>
-        <p:nvSpPr>
-          <p:cNvPr id="2" name="Title 1"/>
-          <p:cNvSpPr>
-            <a:spLocks noGrp="1"/>
-          </p:cNvSpPr>
-          <p:nvPr>
-            <p:ph type="title"/>
-          </p:nvPr>
-        </p:nvSpPr>
-        <p:spPr/>
-        <p:txBody>
-          <a:bodyPr/>
-          <a:lstStyle/>
-          <a:p>
-            <a:r>
-              <a:rPr lang="nb-NO" dirty="0" smtClean="0"/>
-              <a:t>Your options</a:t>
-            </a:r>
-            <a:endParaRPr lang="en-US" dirty="0"/>
-          </a:p>
-        </p:txBody>
-      </p:sp>
-      <p:sp>
-        <p:nvSpPr>
-          <p:cNvPr id="3" name="Content Placeholder 2"/>
-          <p:cNvSpPr>
-            <a:spLocks noGrp="1"/>
-          </p:cNvSpPr>
-          <p:nvPr>
-            <p:ph idx="1"/>
-          </p:nvPr>
-        </p:nvSpPr>
-        <p:spPr/>
-        <p:txBody>
-          <a:bodyPr/>
-          <a:lstStyle/>
-          <a:p>
-            <a:r>
-              <a:rPr lang="nb-NO" dirty="0" smtClean="0"/>
-              <a:t>Work with the </a:t>
+              <a:rPr lang="en-US" dirty="0" err="1" smtClean="0">
+                <a:solidFill>
+                  <a:schemeClr val="accent2"/>
+                </a:solidFill>
+              </a:rPr>
+              <a:t>git</a:t>
+            </a:r>
+            <a:r>
+              <a:rPr lang="en-US" dirty="0" smtClean="0">
+                <a:solidFill>
+                  <a:schemeClr val="accent2"/>
+                </a:solidFill>
+              </a:rPr>
+              <a:t> clone </a:t>
+            </a:r>
+            <a:r>
+              <a:rPr lang="en-US" dirty="0" smtClean="0"/>
+              <a:t>https</a:t>
+            </a:r>
+            <a:r>
+              <a:rPr lang="en-US" dirty="0"/>
+              <a:t>://</a:t>
+            </a:r>
+            <a:r>
+              <a:rPr lang="en-US" dirty="0" smtClean="0"/>
+              <a:t>github.com/eaardal/booster-typescript-angularjs</a:t>
+            </a:r>
+          </a:p>
+          <a:p>
+            <a:endParaRPr lang="nb-NO" dirty="0" smtClean="0"/>
+          </a:p>
+          <a:p>
+            <a:pPr marL="457200" lvl="1" indent="0">
+              <a:buNone/>
+            </a:pPr>
+            <a:r>
+              <a:rPr lang="nb-NO" dirty="0" smtClean="0"/>
+              <a:t>	...\LibraryApp\</a:t>
             </a:r>
             <a:r>
               <a:rPr lang="nb-NO" b="1" dirty="0" smtClean="0">
@@ -7870,20 +8178,26 @@
                   <a:schemeClr val="accent2"/>
                 </a:solidFill>
               </a:rPr>
-              <a:t>C#</a:t>
-            </a:r>
-            <a:r>
-              <a:rPr lang="nb-NO" dirty="0" smtClean="0"/>
-              <a:t> solution</a:t>
-            </a:r>
-          </a:p>
-          <a:p>
+              <a:t>CSharp</a:t>
+            </a:r>
+            <a:r>
+              <a:rPr lang="nb-NO" dirty="0" smtClean="0"/>
+              <a:t>\</a:t>
+            </a:r>
+          </a:p>
+          <a:p>
+            <a:pPr marL="457200" lvl="1" indent="0">
+              <a:buNone/>
+            </a:pPr>
             <a:endParaRPr lang="nb-NO" dirty="0"/>
           </a:p>
           <a:p>
-            <a:r>
-              <a:rPr lang="nb-NO" dirty="0" smtClean="0"/>
-              <a:t>Work with the </a:t>
+            <a:pPr marL="457200" lvl="1" indent="0">
+              <a:buNone/>
+            </a:pPr>
+            <a:r>
+              <a:rPr lang="nb-NO" dirty="0" smtClean="0"/>
+              <a:t>	...\LibraryApp\</a:t>
             </a:r>
             <a:r>
               <a:rPr lang="nb-NO" b="1" dirty="0" smtClean="0">
@@ -7894,25 +8208,23 @@
               <a:t>Java</a:t>
             </a:r>
             <a:r>
-              <a:rPr lang="nb-NO" dirty="0" smtClean="0">
-                <a:solidFill>
-                  <a:schemeClr val="accent2"/>
-                </a:solidFill>
-              </a:rPr>
-              <a:t> </a:t>
-            </a:r>
-            <a:r>
-              <a:rPr lang="nb-NO" dirty="0" smtClean="0"/>
-              <a:t>solution</a:t>
-            </a:r>
-          </a:p>
-          <a:p>
+              <a:rPr lang="nb-NO" dirty="0" smtClean="0"/>
+              <a:t>\</a:t>
+            </a:r>
+          </a:p>
+          <a:p>
+            <a:pPr marL="457200" lvl="1" indent="0">
+              <a:buNone/>
+            </a:pPr>
             <a:endParaRPr lang="nb-NO" dirty="0"/>
           </a:p>
           <a:p>
-            <a:r>
-              <a:rPr lang="nb-NO" dirty="0" smtClean="0"/>
-              <a:t>Work with the </a:t>
+            <a:pPr marL="457200" lvl="1" indent="0">
+              <a:buNone/>
+            </a:pPr>
+            <a:r>
+              <a:rPr lang="nb-NO" dirty="0" smtClean="0"/>
+              <a:t>	...\LibraryApp\</a:t>
             </a:r>
             <a:r>
               <a:rPr lang="nb-NO" b="1" dirty="0" smtClean="0">
@@ -7920,19 +8232,11 @@
                   <a:schemeClr val="accent2"/>
                 </a:solidFill>
               </a:rPr>
-              <a:t>nodejs</a:t>
-            </a:r>
-            <a:r>
-              <a:rPr lang="nb-NO" dirty="0" smtClean="0">
-                <a:solidFill>
-                  <a:schemeClr val="accent2"/>
-                </a:solidFill>
-              </a:rPr>
-              <a:t> </a:t>
-            </a:r>
-            <a:r>
-              <a:rPr lang="nb-NO" dirty="0" smtClean="0"/>
-              <a:t>solution</a:t>
+              <a:t>Node</a:t>
+            </a:r>
+            <a:r>
+              <a:rPr lang="nb-NO" dirty="0" smtClean="0"/>
+              <a:t>\</a:t>
             </a:r>
             <a:endParaRPr lang="en-US" dirty="0"/>
           </a:p>
@@ -7941,173 +8245,7 @@
     </p:spTree>
     <p:extLst>
       <p:ext uri="{BB962C8B-B14F-4D97-AF65-F5344CB8AC3E}">
-        <p14:creationId xmlns:p14="http://schemas.microsoft.com/office/powerpoint/2010/main" val="4237134668"/>
-      </p:ext>
-    </p:extLst>
-  </p:cSld>
-  <p:clrMapOvr>
-    <a:masterClrMapping/>
-  </p:clrMapOvr>
-</p:sld>
-</file>
-
-<file path=ppt/slides/slide29.xml><?xml version="1.0" encoding="utf-8"?>
-<p:sld xmlns:a="http://schemas.openxmlformats.org/drawingml/2006/main" xmlns:r="http://schemas.openxmlformats.org/officeDocument/2006/relationships" xmlns:p="http://schemas.openxmlformats.org/presentationml/2006/main">
-  <p:cSld>
-    <p:spTree>
-      <p:nvGrpSpPr>
-        <p:cNvPr id="1" name=""/>
-        <p:cNvGrpSpPr/>
-        <p:nvPr/>
-      </p:nvGrpSpPr>
-      <p:grpSpPr>
-        <a:xfrm>
-          <a:off x="0" y="0"/>
-          <a:ext cx="0" cy="0"/>
-          <a:chOff x="0" y="0"/>
-          <a:chExt cx="0" cy="0"/>
-        </a:xfrm>
-      </p:grpSpPr>
-      <p:sp>
-        <p:nvSpPr>
-          <p:cNvPr id="2" name="Title 1"/>
-          <p:cNvSpPr>
-            <a:spLocks noGrp="1"/>
-          </p:cNvSpPr>
-          <p:nvPr>
-            <p:ph type="title"/>
-          </p:nvPr>
-        </p:nvSpPr>
-        <p:spPr/>
-        <p:txBody>
-          <a:bodyPr/>
-          <a:lstStyle/>
-          <a:p>
-            <a:r>
-              <a:rPr lang="nb-NO" dirty="0" smtClean="0"/>
-              <a:t>Out of the box for all solutions</a:t>
-            </a:r>
-            <a:endParaRPr lang="en-US" dirty="0"/>
-          </a:p>
-        </p:txBody>
-      </p:sp>
-      <p:sp>
-        <p:nvSpPr>
-          <p:cNvPr id="3" name="Content Placeholder 2"/>
-          <p:cNvSpPr>
-            <a:spLocks noGrp="1"/>
-          </p:cNvSpPr>
-          <p:nvPr>
-            <p:ph idx="1"/>
-          </p:nvPr>
-        </p:nvSpPr>
-        <p:spPr/>
-        <p:txBody>
-          <a:bodyPr/>
-          <a:lstStyle/>
-          <a:p>
-            <a:r>
-              <a:rPr lang="nb-NO" dirty="0" smtClean="0"/>
-              <a:t>AngularJS is wired with:</a:t>
-            </a:r>
-          </a:p>
-          <a:p>
-            <a:pPr lvl="1"/>
-            <a:r>
-              <a:rPr lang="nb-NO" dirty="0" smtClean="0">
-                <a:solidFill>
-                  <a:schemeClr val="accent2"/>
-                </a:solidFill>
-              </a:rPr>
-              <a:t>Routing</a:t>
-            </a:r>
-          </a:p>
-          <a:p>
-            <a:pPr lvl="1"/>
-            <a:r>
-              <a:rPr lang="nb-NO" dirty="0" smtClean="0"/>
-              <a:t>A </a:t>
-            </a:r>
-            <a:r>
-              <a:rPr lang="nb-NO" dirty="0" smtClean="0">
-                <a:solidFill>
-                  <a:schemeClr val="accent2"/>
-                </a:solidFill>
-              </a:rPr>
-              <a:t>directive</a:t>
-            </a:r>
-          </a:p>
-          <a:p>
-            <a:pPr lvl="1"/>
-            <a:r>
-              <a:rPr lang="nb-NO" dirty="0" smtClean="0"/>
-              <a:t>A </a:t>
-            </a:r>
-            <a:r>
-              <a:rPr lang="nb-NO" dirty="0" smtClean="0">
-                <a:solidFill>
-                  <a:schemeClr val="accent2"/>
-                </a:solidFill>
-              </a:rPr>
-              <a:t>service</a:t>
-            </a:r>
-          </a:p>
-          <a:p>
-            <a:pPr lvl="1"/>
-            <a:r>
-              <a:rPr lang="nb-NO" dirty="0" smtClean="0">
-                <a:solidFill>
-                  <a:schemeClr val="accent2"/>
-                </a:solidFill>
-              </a:rPr>
-              <a:t>Views</a:t>
-            </a:r>
-            <a:r>
-              <a:rPr lang="nb-NO" dirty="0" smtClean="0"/>
-              <a:t> with </a:t>
-            </a:r>
-            <a:r>
-              <a:rPr lang="nb-NO" dirty="0" smtClean="0">
-                <a:solidFill>
-                  <a:schemeClr val="accent2"/>
-                </a:solidFill>
-              </a:rPr>
-              <a:t>controllers</a:t>
-            </a:r>
-          </a:p>
-          <a:p>
-            <a:pPr lvl="1"/>
-            <a:endParaRPr lang="nb-NO" dirty="0" smtClean="0">
-              <a:solidFill>
-                <a:schemeClr val="accent2"/>
-              </a:solidFill>
-            </a:endParaRPr>
-          </a:p>
-          <a:p>
-            <a:r>
-              <a:rPr lang="nb-NO" dirty="0" smtClean="0"/>
-              <a:t>The </a:t>
-            </a:r>
-            <a:r>
-              <a:rPr lang="nb-NO" dirty="0" smtClean="0">
-                <a:solidFill>
-                  <a:schemeClr val="accent2"/>
-                </a:solidFill>
-              </a:rPr>
-              <a:t>search for books </a:t>
-            </a:r>
-            <a:r>
-              <a:rPr lang="nb-NO" dirty="0" smtClean="0"/>
-              <a:t>feature is implemented for reference</a:t>
-            </a:r>
-            <a:endParaRPr lang="en-US" dirty="0"/>
-          </a:p>
-        </p:txBody>
-      </p:sp>
-    </p:spTree>
-    <p:extLst>
-      <p:ext uri="{BB962C8B-B14F-4D97-AF65-F5344CB8AC3E}">
-        <p14:creationId xmlns:p14="http://schemas.microsoft.com/office/powerpoint/2010/main" val="666392007"/>
+        <p14:creationId xmlns:p14="http://schemas.microsoft.com/office/powerpoint/2010/main" val="2582542971"/>
       </p:ext>
     </p:extLst>
   </p:cSld>
@@ -8218,408 +8356,6 @@
 </p:sld>
 </file>
 
-<file path=ppt/slides/slide30.xml><?xml version="1.0" encoding="utf-8"?>
-<p:sld xmlns:a="http://schemas.openxmlformats.org/drawingml/2006/main" xmlns:r="http://schemas.openxmlformats.org/officeDocument/2006/relationships" xmlns:p="http://schemas.openxmlformats.org/presentationml/2006/main">
-  <p:cSld>
-    <p:spTree>
-      <p:nvGrpSpPr>
-        <p:cNvPr id="1" name=""/>
-        <p:cNvGrpSpPr/>
-        <p:nvPr/>
-      </p:nvGrpSpPr>
-      <p:grpSpPr>
-        <a:xfrm>
-          <a:off x="0" y="0"/>
-          <a:ext cx="0" cy="0"/>
-          <a:chOff x="0" y="0"/>
-          <a:chExt cx="0" cy="0"/>
-        </a:xfrm>
-      </p:grpSpPr>
-      <p:sp>
-        <p:nvSpPr>
-          <p:cNvPr id="2" name="Title 1"/>
-          <p:cNvSpPr>
-            <a:spLocks noGrp="1"/>
-          </p:cNvSpPr>
-          <p:nvPr>
-            <p:ph type="title"/>
-          </p:nvPr>
-        </p:nvSpPr>
-        <p:spPr/>
-        <p:txBody>
-          <a:bodyPr/>
-          <a:lstStyle/>
-          <a:p>
-            <a:r>
-              <a:rPr lang="nb-NO" dirty="0" smtClean="0"/>
-              <a:t>The backend</a:t>
-            </a:r>
-            <a:endParaRPr lang="en-US" dirty="0"/>
-          </a:p>
-        </p:txBody>
-      </p:sp>
-      <p:sp>
-        <p:nvSpPr>
-          <p:cNvPr id="3" name="Content Placeholder 2"/>
-          <p:cNvSpPr>
-            <a:spLocks noGrp="1"/>
-          </p:cNvSpPr>
-          <p:nvPr>
-            <p:ph idx="1"/>
-          </p:nvPr>
-        </p:nvSpPr>
-        <p:spPr/>
-        <p:txBody>
-          <a:bodyPr/>
-          <a:lstStyle/>
-          <a:p>
-            <a:r>
-              <a:rPr lang="nb-NO" dirty="0" smtClean="0"/>
-              <a:t>Don’t worry about it!</a:t>
-            </a:r>
-          </a:p>
-          <a:p>
-            <a:endParaRPr lang="nb-NO" dirty="0"/>
-          </a:p>
-          <a:p>
-            <a:r>
-              <a:rPr lang="nb-NO" dirty="0" smtClean="0"/>
-              <a:t>http</a:t>
-            </a:r>
-            <a:r>
-              <a:rPr lang="nb-NO" dirty="0"/>
-              <a:t>://</a:t>
-            </a:r>
-            <a:r>
-              <a:rPr lang="nb-NO" dirty="0" smtClean="0"/>
-              <a:t>openmockapi.azurewebsites.net/library</a:t>
-            </a:r>
-            <a:endParaRPr lang="en-US" dirty="0"/>
-          </a:p>
-        </p:txBody>
-      </p:sp>
-    </p:spTree>
-    <p:extLst>
-      <p:ext uri="{BB962C8B-B14F-4D97-AF65-F5344CB8AC3E}">
-        <p14:creationId xmlns:p14="http://schemas.microsoft.com/office/powerpoint/2010/main" val="3764434964"/>
-      </p:ext>
-    </p:extLst>
-  </p:cSld>
-  <p:clrMapOvr>
-    <a:masterClrMapping/>
-  </p:clrMapOvr>
-</p:sld>
-</file>
-
-<file path=ppt/slides/slide31.xml><?xml version="1.0" encoding="utf-8"?>
-<p:sld xmlns:a="http://schemas.openxmlformats.org/drawingml/2006/main" xmlns:r="http://schemas.openxmlformats.org/officeDocument/2006/relationships" xmlns:p="http://schemas.openxmlformats.org/presentationml/2006/main">
-  <p:cSld>
-    <p:spTree>
-      <p:nvGrpSpPr>
-        <p:cNvPr id="1" name=""/>
-        <p:cNvGrpSpPr/>
-        <p:nvPr/>
-      </p:nvGrpSpPr>
-      <p:grpSpPr>
-        <a:xfrm>
-          <a:off x="0" y="0"/>
-          <a:ext cx="0" cy="0"/>
-          <a:chOff x="0" y="0"/>
-          <a:chExt cx="0" cy="0"/>
-        </a:xfrm>
-      </p:grpSpPr>
-      <p:sp>
-        <p:nvSpPr>
-          <p:cNvPr id="2" name="Title 1"/>
-          <p:cNvSpPr>
-            <a:spLocks noGrp="1"/>
-          </p:cNvSpPr>
-          <p:nvPr>
-            <p:ph type="title"/>
-          </p:nvPr>
-        </p:nvSpPr>
-        <p:spPr/>
-        <p:txBody>
-          <a:bodyPr/>
-          <a:lstStyle/>
-          <a:p>
-            <a:r>
-              <a:rPr lang="nb-NO" dirty="0" smtClean="0"/>
-              <a:t>Optional: gulp &amp; node</a:t>
-            </a:r>
-            <a:endParaRPr lang="en-US" dirty="0"/>
-          </a:p>
-        </p:txBody>
-      </p:sp>
-      <p:sp>
-        <p:nvSpPr>
-          <p:cNvPr id="3" name="Content Placeholder 2"/>
-          <p:cNvSpPr>
-            <a:spLocks noGrp="1"/>
-          </p:cNvSpPr>
-          <p:nvPr>
-            <p:ph idx="1"/>
-          </p:nvPr>
-        </p:nvSpPr>
-        <p:spPr/>
-        <p:txBody>
-          <a:bodyPr/>
-          <a:lstStyle/>
-          <a:p>
-            <a:r>
-              <a:rPr lang="nb-NO" dirty="0" smtClean="0"/>
-              <a:t>The </a:t>
-            </a:r>
-            <a:r>
-              <a:rPr lang="nb-NO" b="1" dirty="0" smtClean="0"/>
-              <a:t>automation framework </a:t>
-            </a:r>
-            <a:r>
-              <a:rPr lang="nb-NO" dirty="0" smtClean="0">
-                <a:solidFill>
-                  <a:schemeClr val="accent2"/>
-                </a:solidFill>
-              </a:rPr>
-              <a:t>gulp</a:t>
-            </a:r>
-            <a:r>
-              <a:rPr lang="nb-NO" dirty="0" smtClean="0"/>
-              <a:t> is present for all solutions</a:t>
-            </a:r>
-          </a:p>
-          <a:p>
-            <a:endParaRPr lang="nb-NO" dirty="0" smtClean="0"/>
-          </a:p>
-          <a:p>
-            <a:r>
-              <a:rPr lang="nb-NO" dirty="0" smtClean="0"/>
-              <a:t>The default </a:t>
-            </a:r>
-            <a:r>
-              <a:rPr lang="nb-NO" dirty="0" smtClean="0">
-                <a:solidFill>
-                  <a:schemeClr val="accent2"/>
-                </a:solidFill>
-              </a:rPr>
-              <a:t>gulp</a:t>
-            </a:r>
-            <a:r>
-              <a:rPr lang="nb-NO" dirty="0" smtClean="0"/>
-              <a:t> command will rebuild all .ts files</a:t>
-            </a:r>
-          </a:p>
-          <a:p>
-            <a:r>
-              <a:rPr lang="nb-NO" dirty="0" smtClean="0"/>
-              <a:t>The </a:t>
-            </a:r>
-            <a:r>
-              <a:rPr lang="nb-NO" dirty="0" smtClean="0">
-                <a:solidFill>
-                  <a:schemeClr val="accent2"/>
-                </a:solidFill>
-              </a:rPr>
-              <a:t>gulp watch </a:t>
-            </a:r>
-            <a:r>
-              <a:rPr lang="nb-NO" dirty="0" smtClean="0"/>
-              <a:t>command will watch for, and build on changes</a:t>
-            </a:r>
-            <a:endParaRPr lang="nb-NO" dirty="0"/>
-          </a:p>
-          <a:p>
-            <a:endParaRPr lang="nb-NO" dirty="0" smtClean="0"/>
-          </a:p>
-          <a:p>
-            <a:r>
-              <a:rPr lang="nb-NO" dirty="0" smtClean="0"/>
-              <a:t>Readme.txt </a:t>
-            </a:r>
-            <a:endParaRPr lang="nb-NO" dirty="0"/>
-          </a:p>
-          <a:p>
-            <a:endParaRPr lang="nb-NO" dirty="0"/>
-          </a:p>
-          <a:p>
-            <a:r>
-              <a:rPr lang="nb-NO" dirty="0" smtClean="0"/>
-              <a:t>Explore the gulpfile.js</a:t>
-            </a:r>
-            <a:endParaRPr lang="en-US" dirty="0"/>
-          </a:p>
-        </p:txBody>
-      </p:sp>
-    </p:spTree>
-    <p:extLst>
-      <p:ext uri="{BB962C8B-B14F-4D97-AF65-F5344CB8AC3E}">
-        <p14:creationId xmlns:p14="http://schemas.microsoft.com/office/powerpoint/2010/main" val="3394789111"/>
-      </p:ext>
-    </p:extLst>
-  </p:cSld>
-  <p:clrMapOvr>
-    <a:masterClrMapping/>
-  </p:clrMapOvr>
-</p:sld>
-</file>
-
-<file path=ppt/slides/slide32.xml><?xml version="1.0" encoding="utf-8"?>
-<p:sld xmlns:a="http://schemas.openxmlformats.org/drawingml/2006/main" xmlns:r="http://schemas.openxmlformats.org/officeDocument/2006/relationships" xmlns:p="http://schemas.openxmlformats.org/presentationml/2006/main">
-  <p:cSld>
-    <p:spTree>
-      <p:nvGrpSpPr>
-        <p:cNvPr id="1" name=""/>
-        <p:cNvGrpSpPr/>
-        <p:nvPr/>
-      </p:nvGrpSpPr>
-      <p:grpSpPr>
-        <a:xfrm>
-          <a:off x="0" y="0"/>
-          <a:ext cx="0" cy="0"/>
-          <a:chOff x="0" y="0"/>
-          <a:chExt cx="0" cy="0"/>
-        </a:xfrm>
-      </p:grpSpPr>
-      <p:sp>
-        <p:nvSpPr>
-          <p:cNvPr id="2" name="Title 1"/>
-          <p:cNvSpPr>
-            <a:spLocks noGrp="1"/>
-          </p:cNvSpPr>
-          <p:nvPr>
-            <p:ph type="title"/>
-          </p:nvPr>
-        </p:nvSpPr>
-        <p:spPr/>
-        <p:txBody>
-          <a:bodyPr/>
-          <a:lstStyle/>
-          <a:p>
-            <a:r>
-              <a:rPr lang="nb-NO" dirty="0" smtClean="0"/>
-              <a:t>Show me the code</a:t>
-            </a:r>
-            <a:endParaRPr lang="en-US" dirty="0"/>
-          </a:p>
-        </p:txBody>
-      </p:sp>
-      <p:sp>
-        <p:nvSpPr>
-          <p:cNvPr id="3" name="Content Placeholder 2"/>
-          <p:cNvSpPr>
-            <a:spLocks noGrp="1"/>
-          </p:cNvSpPr>
-          <p:nvPr>
-            <p:ph idx="1"/>
-          </p:nvPr>
-        </p:nvSpPr>
-        <p:spPr/>
-        <p:txBody>
-          <a:bodyPr/>
-          <a:lstStyle/>
-          <a:p>
-            <a:r>
-              <a:rPr lang="en-US" dirty="0"/>
-              <a:t>https://</a:t>
-            </a:r>
-            <a:r>
-              <a:rPr lang="en-US" dirty="0" smtClean="0"/>
-              <a:t>github.com/eaardal/booster-typescript-angularjs</a:t>
-            </a:r>
-          </a:p>
-          <a:p>
-            <a:endParaRPr lang="nb-NO" dirty="0" smtClean="0"/>
-          </a:p>
-          <a:p>
-            <a:pPr marL="457200" lvl="1" indent="0">
-              <a:buNone/>
-            </a:pPr>
-            <a:r>
-              <a:rPr lang="nb-NO" dirty="0" smtClean="0"/>
-              <a:t>	...\LibraryApp\</a:t>
-            </a:r>
-            <a:r>
-              <a:rPr lang="nb-NO" b="1" dirty="0" smtClean="0">
-                <a:solidFill>
-                  <a:schemeClr val="accent2"/>
-                </a:solidFill>
-              </a:rPr>
-              <a:t>CSharp</a:t>
-            </a:r>
-            <a:r>
-              <a:rPr lang="nb-NO" dirty="0" smtClean="0"/>
-              <a:t>\</a:t>
-            </a:r>
-          </a:p>
-          <a:p>
-            <a:pPr marL="457200" lvl="1" indent="0">
-              <a:buNone/>
-            </a:pPr>
-            <a:endParaRPr lang="nb-NO" dirty="0"/>
-          </a:p>
-          <a:p>
-            <a:pPr marL="457200" lvl="1" indent="0">
-              <a:buNone/>
-            </a:pPr>
-            <a:r>
-              <a:rPr lang="nb-NO" dirty="0" smtClean="0"/>
-              <a:t>	...\LibraryApp\</a:t>
-            </a:r>
-            <a:r>
-              <a:rPr lang="nb-NO" b="1" dirty="0" smtClean="0">
-                <a:solidFill>
-                  <a:schemeClr val="accent2"/>
-                </a:solidFill>
-              </a:rPr>
-              <a:t>Java</a:t>
-            </a:r>
-            <a:r>
-              <a:rPr lang="nb-NO" dirty="0" smtClean="0"/>
-              <a:t>\</a:t>
-            </a:r>
-          </a:p>
-          <a:p>
-            <a:pPr marL="457200" lvl="1" indent="0">
-              <a:buNone/>
-            </a:pPr>
-            <a:endParaRPr lang="nb-NO" dirty="0"/>
-          </a:p>
-          <a:p>
-            <a:pPr marL="457200" lvl="1" indent="0">
-              <a:buNone/>
-            </a:pPr>
-            <a:r>
-              <a:rPr lang="nb-NO" dirty="0" smtClean="0"/>
-              <a:t>	...\LibraryApp\</a:t>
-            </a:r>
-            <a:r>
-              <a:rPr lang="nb-NO" b="1" dirty="0" smtClean="0">
-                <a:solidFill>
-                  <a:schemeClr val="accent2"/>
-                </a:solidFill>
-              </a:rPr>
-              <a:t>Node</a:t>
-            </a:r>
-            <a:r>
-              <a:rPr lang="nb-NO" dirty="0" smtClean="0"/>
-              <a:t>\</a:t>
-            </a:r>
-            <a:endParaRPr lang="en-US" dirty="0"/>
-          </a:p>
-        </p:txBody>
-      </p:sp>
-    </p:spTree>
-    <p:extLst>
-      <p:ext uri="{BB962C8B-B14F-4D97-AF65-F5344CB8AC3E}">
-        <p14:creationId xmlns:p14="http://schemas.microsoft.com/office/powerpoint/2010/main" val="2582542971"/>
-      </p:ext>
-    </p:extLst>
-  </p:cSld>
-  <p:clrMapOvr>
-    <a:masterClrMapping/>
-  </p:clrMapOvr>
-</p:sld>
-</file>
-
 <file path=ppt/slides/slide4.xml><?xml version="1.0" encoding="utf-8"?>
 <p:sld xmlns:a="http://schemas.openxmlformats.org/drawingml/2006/main" xmlns:r="http://schemas.openxmlformats.org/officeDocument/2006/relationships" xmlns:p="http://schemas.openxmlformats.org/presentationml/2006/main">
   <p:cSld>
@@ -8693,8 +8429,9 @@
           <a:p>
             <a:r>
               <a:rPr lang="nb-NO" dirty="0" smtClean="0"/>
-              <a:t>Node/npm</a:t>
-            </a:r>
+              <a:t>Not required, but strongly recommended: node/npm</a:t>
+            </a:r>
+            <a:endParaRPr lang="nb-NO" dirty="0" smtClean="0"/>
           </a:p>
           <a:p>
             <a:endParaRPr lang="nb-NO" dirty="0" smtClean="0"/>
@@ -8822,7 +8559,7 @@
           <a:p>
             <a:r>
               <a:rPr lang="nb-NO" dirty="0" smtClean="0"/>
-              <a:t>Installation: Visual Studio</a:t>
+              <a:t>Installation: Easiest solution</a:t>
             </a:r>
             <a:endParaRPr lang="en-US" dirty="0"/>
           </a:p>
@@ -8838,6 +8575,175 @@
             <p:ph idx="1"/>
           </p:nvPr>
         </p:nvSpPr>
+        <p:spPr>
+          <a:xfrm>
+            <a:off x="1104293" y="1597875"/>
+            <a:ext cx="8946541" cy="4539314"/>
+          </a:xfrm>
+        </p:spPr>
+        <p:txBody>
+          <a:bodyPr>
+            <a:normAutofit/>
+          </a:bodyPr>
+          <a:lstStyle/>
+          <a:p>
+            <a:r>
+              <a:rPr lang="nb-NO" dirty="0" smtClean="0">
+                <a:solidFill>
+                  <a:schemeClr val="accent2"/>
+                </a:solidFill>
+              </a:rPr>
+              <a:t>npm install –g typescript</a:t>
+            </a:r>
+          </a:p>
+          <a:p>
+            <a:endParaRPr lang="nb-NO" dirty="0"/>
+          </a:p>
+          <a:p>
+            <a:r>
+              <a:rPr lang="nb-NO" dirty="0" smtClean="0"/>
+              <a:t>Ensure </a:t>
+            </a:r>
+            <a:r>
+              <a:rPr lang="nb-NO" dirty="0" smtClean="0">
+                <a:solidFill>
+                  <a:schemeClr val="accent2"/>
+                </a:solidFill>
+              </a:rPr>
+              <a:t>tsc.exe</a:t>
+            </a:r>
+            <a:r>
+              <a:rPr lang="nb-NO" dirty="0" smtClean="0"/>
+              <a:t> is on your PATH by: </a:t>
+            </a:r>
+            <a:r>
+              <a:rPr lang="nb-NO" dirty="0" smtClean="0">
+                <a:solidFill>
+                  <a:schemeClr val="accent2"/>
+                </a:solidFill>
+              </a:rPr>
+              <a:t>tsc --version </a:t>
+            </a:r>
+            <a:r>
+              <a:rPr lang="nb-NO" dirty="0" smtClean="0"/>
+              <a:t>in command line</a:t>
+            </a:r>
+          </a:p>
+          <a:p>
+            <a:pPr marL="0" indent="0">
+              <a:buNone/>
+            </a:pPr>
+            <a:endParaRPr lang="nb-NO" dirty="0"/>
+          </a:p>
+          <a:p>
+            <a:r>
+              <a:rPr lang="nb-NO" dirty="0" smtClean="0"/>
+              <a:t>Use automation tool </a:t>
+            </a:r>
+            <a:r>
+              <a:rPr lang="nb-NO" dirty="0" smtClean="0">
+                <a:solidFill>
+                  <a:schemeClr val="accent2"/>
+                </a:solidFill>
+              </a:rPr>
+              <a:t>grunt</a:t>
+            </a:r>
+            <a:r>
+              <a:rPr lang="nb-NO" dirty="0" smtClean="0"/>
+              <a:t> or </a:t>
+            </a:r>
+            <a:r>
+              <a:rPr lang="nb-NO" dirty="0" smtClean="0">
+                <a:solidFill>
+                  <a:schemeClr val="accent2"/>
+                </a:solidFill>
+              </a:rPr>
+              <a:t>gulp</a:t>
+            </a:r>
+            <a:r>
+              <a:rPr lang="nb-NO" dirty="0" smtClean="0"/>
+              <a:t> to automatically build </a:t>
+            </a:r>
+            <a:r>
+              <a:rPr lang="nb-NO" dirty="0" smtClean="0">
+                <a:solidFill>
+                  <a:schemeClr val="accent2"/>
+                </a:solidFill>
+              </a:rPr>
+              <a:t>.ts </a:t>
+            </a:r>
+            <a:r>
+              <a:rPr lang="nb-NO" dirty="0" smtClean="0"/>
+              <a:t>to </a:t>
+            </a:r>
+            <a:r>
+              <a:rPr lang="nb-NO" dirty="0" smtClean="0">
+                <a:solidFill>
+                  <a:schemeClr val="accent2"/>
+                </a:solidFill>
+              </a:rPr>
+              <a:t>.js </a:t>
+            </a:r>
+            <a:r>
+              <a:rPr lang="nb-NO" dirty="0" smtClean="0"/>
+              <a:t>on file changes.</a:t>
+            </a:r>
+          </a:p>
+          <a:p>
+            <a:endParaRPr lang="nb-NO" dirty="0"/>
+          </a:p>
+          <a:p>
+            <a:endParaRPr lang="nb-NO" dirty="0" smtClean="0"/>
+          </a:p>
+        </p:txBody>
+      </p:sp>
+    </p:spTree>
+    <p:extLst>
+      <p:ext uri="{BB962C8B-B14F-4D97-AF65-F5344CB8AC3E}">
+        <p14:creationId xmlns:p14="http://schemas.microsoft.com/office/powerpoint/2010/main" val="957098004"/>
+      </p:ext>
+    </p:extLst>
+  </p:cSld>
+  <p:clrMapOvr>
+    <a:masterClrMapping/>
+  </p:clrMapOvr>
+  <p:timing>
+    <p:tnLst>
+      <p:par>
+        <p:cTn id="1" dur="indefinite" restart="never" nodeType="tmRoot"/>
+      </p:par>
+    </p:tnLst>
+  </p:timing>
+</p:sld>
+</file>
+
+<file path=ppt/slides/slide6.xml><?xml version="1.0" encoding="utf-8"?>
+<p:sld xmlns:a="http://schemas.openxmlformats.org/drawingml/2006/main" xmlns:r="http://schemas.openxmlformats.org/officeDocument/2006/relationships" xmlns:p="http://schemas.openxmlformats.org/presentationml/2006/main">
+  <p:cSld>
+    <p:spTree>
+      <p:nvGrpSpPr>
+        <p:cNvPr id="1" name=""/>
+        <p:cNvGrpSpPr/>
+        <p:nvPr/>
+      </p:nvGrpSpPr>
+      <p:grpSpPr>
+        <a:xfrm>
+          <a:off x="0" y="0"/>
+          <a:ext cx="0" cy="0"/>
+          <a:chOff x="0" y="0"/>
+          <a:chExt cx="0" cy="0"/>
+        </a:xfrm>
+      </p:grpSpPr>
+      <p:sp>
+        <p:nvSpPr>
+          <p:cNvPr id="2" name="Title 1"/>
+          <p:cNvSpPr>
+            <a:spLocks noGrp="1"/>
+          </p:cNvSpPr>
+          <p:nvPr>
+            <p:ph type="title"/>
+          </p:nvPr>
+        </p:nvSpPr>
         <p:spPr/>
         <p:txBody>
           <a:bodyPr/>
@@ -8845,8 +8751,195 @@
           <a:p>
             <a:r>
               <a:rPr lang="nb-NO" dirty="0" smtClean="0"/>
-              <a:t>You probably have it! (VS 2013 Update 2 and later)</a:t>
-            </a:r>
+              <a:t>Tool support</a:t>
+            </a:r>
+            <a:endParaRPr lang="en-US" dirty="0"/>
+          </a:p>
+        </p:txBody>
+      </p:sp>
+      <p:sp>
+        <p:nvSpPr>
+          <p:cNvPr id="3" name="Content Placeholder 2"/>
+          <p:cNvSpPr>
+            <a:spLocks noGrp="1"/>
+          </p:cNvSpPr>
+          <p:nvPr>
+            <p:ph idx="1"/>
+          </p:nvPr>
+        </p:nvSpPr>
+        <p:spPr>
+          <a:xfrm>
+            <a:off x="1103312" y="1515762"/>
+            <a:ext cx="8946541" cy="4732637"/>
+          </a:xfrm>
+        </p:spPr>
+        <p:txBody>
+          <a:bodyPr/>
+          <a:lstStyle/>
+          <a:p>
+            <a:r>
+              <a:rPr lang="nb-NO" dirty="0" smtClean="0"/>
+              <a:t>Automatically build</a:t>
+            </a:r>
+            <a:r>
+              <a:rPr lang="nb-NO" dirty="0" smtClean="0">
+                <a:solidFill>
+                  <a:schemeClr val="accent2"/>
+                </a:solidFill>
+              </a:rPr>
+              <a:t> .ts </a:t>
+            </a:r>
+            <a:r>
+              <a:rPr lang="nb-NO" dirty="0" smtClean="0"/>
+              <a:t>to</a:t>
+            </a:r>
+            <a:r>
+              <a:rPr lang="nb-NO" dirty="0" smtClean="0">
+                <a:solidFill>
+                  <a:schemeClr val="accent2"/>
+                </a:solidFill>
+              </a:rPr>
+              <a:t> .js </a:t>
+            </a:r>
+            <a:r>
+              <a:rPr lang="nb-NO" dirty="0" smtClean="0"/>
+              <a:t>when saving a file</a:t>
+            </a:r>
+          </a:p>
+          <a:p>
+            <a:endParaRPr lang="nb-NO" dirty="0"/>
+          </a:p>
+          <a:p>
+            <a:r>
+              <a:rPr lang="nb-NO" dirty="0" smtClean="0"/>
+              <a:t>If using </a:t>
+            </a:r>
+            <a:r>
+              <a:rPr lang="nb-NO" dirty="0" smtClean="0">
+                <a:solidFill>
+                  <a:schemeClr val="accent2"/>
+                </a:solidFill>
+              </a:rPr>
+              <a:t>grunt</a:t>
+            </a:r>
+            <a:r>
+              <a:rPr lang="nb-NO" dirty="0" smtClean="0"/>
+              <a:t> or </a:t>
+            </a:r>
+            <a:r>
+              <a:rPr lang="nb-NO" dirty="0" smtClean="0">
+                <a:solidFill>
+                  <a:schemeClr val="accent2"/>
+                </a:solidFill>
+              </a:rPr>
+              <a:t>gulp</a:t>
+            </a:r>
+            <a:r>
+              <a:rPr lang="nb-NO" dirty="0" smtClean="0"/>
+              <a:t>, ignore the next slides...</a:t>
+            </a:r>
+            <a:endParaRPr lang="nb-NO" dirty="0" smtClean="0"/>
+          </a:p>
+          <a:p>
+            <a:endParaRPr lang="nb-NO" dirty="0" smtClean="0"/>
+          </a:p>
+        </p:txBody>
+      </p:sp>
+    </p:spTree>
+    <p:extLst>
+      <p:ext uri="{BB962C8B-B14F-4D97-AF65-F5344CB8AC3E}">
+        <p14:creationId xmlns:p14="http://schemas.microsoft.com/office/powerpoint/2010/main" val="3413816434"/>
+      </p:ext>
+    </p:extLst>
+  </p:cSld>
+  <p:clrMapOvr>
+    <a:masterClrMapping/>
+  </p:clrMapOvr>
+  <p:timing>
+    <p:tnLst>
+      <p:par>
+        <p:cTn id="1" dur="indefinite" restart="never" nodeType="tmRoot"/>
+      </p:par>
+    </p:tnLst>
+  </p:timing>
+</p:sld>
+</file>
+
+<file path=ppt/slides/slide7.xml><?xml version="1.0" encoding="utf-8"?>
+<p:sld xmlns:a="http://schemas.openxmlformats.org/drawingml/2006/main" xmlns:r="http://schemas.openxmlformats.org/officeDocument/2006/relationships" xmlns:p="http://schemas.openxmlformats.org/presentationml/2006/main">
+  <p:cSld>
+    <p:spTree>
+      <p:nvGrpSpPr>
+        <p:cNvPr id="1" name=""/>
+        <p:cNvGrpSpPr/>
+        <p:nvPr/>
+      </p:nvGrpSpPr>
+      <p:grpSpPr>
+        <a:xfrm>
+          <a:off x="0" y="0"/>
+          <a:ext cx="0" cy="0"/>
+          <a:chOff x="0" y="0"/>
+          <a:chExt cx="0" cy="0"/>
+        </a:xfrm>
+      </p:grpSpPr>
+      <p:sp>
+        <p:nvSpPr>
+          <p:cNvPr id="2" name="Title 1"/>
+          <p:cNvSpPr>
+            <a:spLocks noGrp="1"/>
+          </p:cNvSpPr>
+          <p:nvPr>
+            <p:ph type="title"/>
+          </p:nvPr>
+        </p:nvSpPr>
+        <p:spPr/>
+        <p:txBody>
+          <a:bodyPr/>
+          <a:lstStyle/>
+          <a:p>
+            <a:r>
+              <a:rPr lang="nb-NO" dirty="0" smtClean="0"/>
+              <a:t>Tool support: </a:t>
+            </a:r>
+            <a:r>
+              <a:rPr lang="nb-NO" dirty="0" smtClean="0"/>
+              <a:t>Visual Studio</a:t>
+            </a:r>
+            <a:endParaRPr lang="en-US" dirty="0"/>
+          </a:p>
+        </p:txBody>
+      </p:sp>
+      <p:sp>
+        <p:nvSpPr>
+          <p:cNvPr id="3" name="Content Placeholder 2"/>
+          <p:cNvSpPr>
+            <a:spLocks noGrp="1"/>
+          </p:cNvSpPr>
+          <p:nvPr>
+            <p:ph idx="1"/>
+          </p:nvPr>
+        </p:nvSpPr>
+        <p:spPr>
+          <a:xfrm>
+            <a:off x="1103312" y="1515762"/>
+            <a:ext cx="8946541" cy="4732637"/>
+          </a:xfrm>
+        </p:spPr>
+        <p:txBody>
+          <a:bodyPr/>
+          <a:lstStyle/>
+          <a:p>
+            <a:r>
+              <a:rPr lang="nb-NO" dirty="0" smtClean="0"/>
+              <a:t>TypeScript ships with VS 2013 Update 2 and later</a:t>
+            </a:r>
+          </a:p>
+          <a:p>
+            <a:r>
+              <a:rPr lang="nb-NO" dirty="0" smtClean="0"/>
+              <a:t>But you may need to download 1.4 separately (ships with Update 4)</a:t>
+            </a:r>
+            <a:endParaRPr lang="nb-NO" dirty="0" smtClean="0"/>
           </a:p>
           <a:p>
             <a:endParaRPr lang="nb-NO" dirty="0" smtClean="0"/>
@@ -9067,164 +9160,6 @@
 </p:sld>
 </file>
 
-<file path=ppt/slides/slide6.xml><?xml version="1.0" encoding="utf-8"?>
-<p:sld xmlns:a="http://schemas.openxmlformats.org/drawingml/2006/main" xmlns:r="http://schemas.openxmlformats.org/officeDocument/2006/relationships" xmlns:p="http://schemas.openxmlformats.org/presentationml/2006/main">
-  <p:cSld>
-    <p:spTree>
-      <p:nvGrpSpPr>
-        <p:cNvPr id="1" name=""/>
-        <p:cNvGrpSpPr/>
-        <p:nvPr/>
-      </p:nvGrpSpPr>
-      <p:grpSpPr>
-        <a:xfrm>
-          <a:off x="0" y="0"/>
-          <a:ext cx="0" cy="0"/>
-          <a:chOff x="0" y="0"/>
-          <a:chExt cx="0" cy="0"/>
-        </a:xfrm>
-      </p:grpSpPr>
-      <p:sp>
-        <p:nvSpPr>
-          <p:cNvPr id="2" name="Title 1"/>
-          <p:cNvSpPr>
-            <a:spLocks noGrp="1"/>
-          </p:cNvSpPr>
-          <p:nvPr>
-            <p:ph type="title"/>
-          </p:nvPr>
-        </p:nvSpPr>
-        <p:spPr/>
-        <p:txBody>
-          <a:bodyPr/>
-          <a:lstStyle/>
-          <a:p>
-            <a:r>
-              <a:rPr lang="nb-NO" dirty="0" smtClean="0"/>
-              <a:t>Installation: IntelliJ / WebStorm</a:t>
-            </a:r>
-            <a:endParaRPr lang="en-US" dirty="0"/>
-          </a:p>
-        </p:txBody>
-      </p:sp>
-      <p:sp>
-        <p:nvSpPr>
-          <p:cNvPr id="3" name="Content Placeholder 2"/>
-          <p:cNvSpPr>
-            <a:spLocks noGrp="1"/>
-          </p:cNvSpPr>
-          <p:nvPr>
-            <p:ph idx="1"/>
-          </p:nvPr>
-        </p:nvSpPr>
-        <p:spPr/>
-        <p:txBody>
-          <a:bodyPr/>
-          <a:lstStyle/>
-          <a:p>
-            <a:endParaRPr lang="en-US"/>
-          </a:p>
-        </p:txBody>
-      </p:sp>
-    </p:spTree>
-    <p:extLst>
-      <p:ext uri="{BB962C8B-B14F-4D97-AF65-F5344CB8AC3E}">
-        <p14:creationId xmlns:p14="http://schemas.microsoft.com/office/powerpoint/2010/main" val="1155043881"/>
-      </p:ext>
-    </p:extLst>
-  </p:cSld>
-  <p:clrMapOvr>
-    <a:masterClrMapping/>
-  </p:clrMapOvr>
-  <p:timing>
-    <p:tnLst>
-      <p:par>
-        <p:cTn id="1" dur="indefinite" restart="never" nodeType="tmRoot"/>
-      </p:par>
-    </p:tnLst>
-  </p:timing>
-</p:sld>
-</file>
-
-<file path=ppt/slides/slide7.xml><?xml version="1.0" encoding="utf-8"?>
-<p:sld xmlns:a="http://schemas.openxmlformats.org/drawingml/2006/main" xmlns:r="http://schemas.openxmlformats.org/officeDocument/2006/relationships" xmlns:p="http://schemas.openxmlformats.org/presentationml/2006/main">
-  <p:cSld>
-    <p:spTree>
-      <p:nvGrpSpPr>
-        <p:cNvPr id="1" name=""/>
-        <p:cNvGrpSpPr/>
-        <p:nvPr/>
-      </p:nvGrpSpPr>
-      <p:grpSpPr>
-        <a:xfrm>
-          <a:off x="0" y="0"/>
-          <a:ext cx="0" cy="0"/>
-          <a:chOff x="0" y="0"/>
-          <a:chExt cx="0" cy="0"/>
-        </a:xfrm>
-      </p:grpSpPr>
-      <p:sp>
-        <p:nvSpPr>
-          <p:cNvPr id="2" name="Title 1"/>
-          <p:cNvSpPr>
-            <a:spLocks noGrp="1"/>
-          </p:cNvSpPr>
-          <p:nvPr>
-            <p:ph type="title"/>
-          </p:nvPr>
-        </p:nvSpPr>
-        <p:spPr/>
-        <p:txBody>
-          <a:bodyPr/>
-          <a:lstStyle/>
-          <a:p>
-            <a:r>
-              <a:rPr lang="nb-NO" dirty="0" smtClean="0"/>
-              <a:t>Installation: SublimeText 3</a:t>
-            </a:r>
-            <a:endParaRPr lang="en-US" dirty="0"/>
-          </a:p>
-        </p:txBody>
-      </p:sp>
-      <p:sp>
-        <p:nvSpPr>
-          <p:cNvPr id="3" name="Content Placeholder 2"/>
-          <p:cNvSpPr>
-            <a:spLocks noGrp="1"/>
-          </p:cNvSpPr>
-          <p:nvPr>
-            <p:ph idx="1"/>
-          </p:nvPr>
-        </p:nvSpPr>
-        <p:spPr/>
-        <p:txBody>
-          <a:bodyPr/>
-          <a:lstStyle/>
-          <a:p>
-            <a:endParaRPr lang="en-US"/>
-          </a:p>
-        </p:txBody>
-      </p:sp>
-    </p:spTree>
-    <p:extLst>
-      <p:ext uri="{BB962C8B-B14F-4D97-AF65-F5344CB8AC3E}">
-        <p14:creationId xmlns:p14="http://schemas.microsoft.com/office/powerpoint/2010/main" val="3926077882"/>
-      </p:ext>
-    </p:extLst>
-  </p:cSld>
-  <p:clrMapOvr>
-    <a:masterClrMapping/>
-  </p:clrMapOvr>
-  <p:timing>
-    <p:tnLst>
-      <p:par>
-        <p:cTn id="1" dur="indefinite" restart="never" nodeType="tmRoot"/>
-      </p:par>
-    </p:tnLst>
-  </p:timing>
-</p:sld>
-</file>
-
 <file path=ppt/slides/slide8.xml><?xml version="1.0" encoding="utf-8"?>
 <p:sld xmlns:a="http://schemas.openxmlformats.org/drawingml/2006/main" xmlns:r="http://schemas.openxmlformats.org/officeDocument/2006/relationships" xmlns:p="http://schemas.openxmlformats.org/presentationml/2006/main">
   <p:cSld>
@@ -9259,7 +9194,7 @@
           <a:p>
             <a:r>
               <a:rPr lang="nb-NO" dirty="0" smtClean="0"/>
-              <a:t>Installation: node/npm and cmd</a:t>
+              <a:t>Installation: IntelliJ / WebStorm</a:t>
             </a:r>
             <a:endParaRPr lang="en-US" dirty="0"/>
           </a:p>
@@ -9275,19 +9210,146 @@
             <p:ph idx="1"/>
           </p:nvPr>
         </p:nvSpPr>
-        <p:spPr/>
-        <p:txBody>
-          <a:bodyPr/>
-          <a:lstStyle/>
-          <a:p>
-            <a:endParaRPr lang="en-US"/>
-          </a:p>
-        </p:txBody>
-      </p:sp>
+        <p:spPr>
+          <a:xfrm>
+            <a:off x="875201" y="1500983"/>
+            <a:ext cx="8946541" cy="4195481"/>
+          </a:xfrm>
+        </p:spPr>
+        <p:txBody>
+          <a:bodyPr/>
+          <a:lstStyle/>
+          <a:p>
+            <a:r>
+              <a:rPr lang="nb-NO" dirty="0" smtClean="0"/>
+              <a:t>In IntelliJ: File -&gt; Settings -&gt; [IDE Settings] Plugins -&gt; Browse Repositories -&gt; Search «file watchers». </a:t>
+            </a:r>
+            <a:r>
+              <a:rPr lang="nb-NO" dirty="0" smtClean="0"/>
+              <a:t>Install File Watchers plugin.</a:t>
+            </a:r>
+          </a:p>
+          <a:p>
+            <a:endParaRPr lang="nb-NO" dirty="0" smtClean="0"/>
+          </a:p>
+          <a:p>
+            <a:r>
+              <a:rPr lang="nb-NO" dirty="0" smtClean="0"/>
+              <a:t>Auto detection:</a:t>
+            </a:r>
+          </a:p>
+          <a:p>
+            <a:endParaRPr lang="nb-NO" dirty="0"/>
+          </a:p>
+          <a:p>
+            <a:endParaRPr lang="nb-NO" dirty="0" smtClean="0"/>
+          </a:p>
+          <a:p>
+            <a:endParaRPr lang="nb-NO" dirty="0"/>
+          </a:p>
+          <a:p>
+            <a:endParaRPr lang="nb-NO" dirty="0" smtClean="0"/>
+          </a:p>
+          <a:p>
+            <a:r>
+              <a:rPr lang="nb-NO" dirty="0" smtClean="0"/>
+              <a:t>If no auto detect pops up, see next slide...</a:t>
+            </a:r>
+            <a:endParaRPr lang="en-US" dirty="0"/>
+          </a:p>
+        </p:txBody>
+      </p:sp>
+      <p:pic>
+        <p:nvPicPr>
+          <p:cNvPr id="5" name="Picture 4"/>
+          <p:cNvPicPr>
+            <a:picLocks noChangeAspect="1"/>
+          </p:cNvPicPr>
+          <p:nvPr/>
+        </p:nvPicPr>
+        <p:blipFill>
+          <a:blip r:embed="rId2"/>
+          <a:stretch>
+            <a:fillRect/>
+          </a:stretch>
+        </p:blipFill>
+        <p:spPr>
+          <a:xfrm>
+            <a:off x="7735330" y="2940894"/>
+            <a:ext cx="4089184" cy="3694418"/>
+          </a:xfrm>
+          <a:prstGeom prst="rect">
+            <a:avLst/>
+          </a:prstGeom>
+        </p:spPr>
+      </p:pic>
+      <p:pic>
+        <p:nvPicPr>
+          <p:cNvPr id="7" name="Picture 6"/>
+          <p:cNvPicPr>
+            <a:picLocks noChangeAspect="1"/>
+          </p:cNvPicPr>
+          <p:nvPr/>
+        </p:nvPicPr>
+        <p:blipFill>
+          <a:blip r:embed="rId3">
+            <a:extLst>
+              <a:ext uri="{28A0092B-C50C-407E-A947-70E740481C1C}">
+                <a14:useLocalDpi xmlns:a14="http://schemas.microsoft.com/office/drawing/2010/main" val="0"/>
+              </a:ext>
+            </a:extLst>
+          </a:blip>
+          <a:stretch>
+            <a:fillRect/>
+          </a:stretch>
+        </p:blipFill>
+        <p:spPr>
+          <a:xfrm>
+            <a:off x="1132731" y="3498518"/>
+            <a:ext cx="5593436" cy="276337"/>
+          </a:xfrm>
+          <a:prstGeom prst="rect">
+            <a:avLst/>
+          </a:prstGeom>
+        </p:spPr>
+      </p:pic>
+      <p:cxnSp>
+        <p:nvCxnSpPr>
+          <p:cNvPr id="9" name="Straight Arrow Connector 8"/>
+          <p:cNvCxnSpPr/>
+          <p:nvPr/>
+        </p:nvCxnSpPr>
+        <p:spPr>
+          <a:xfrm flipV="1">
+            <a:off x="6145427" y="3498518"/>
+            <a:ext cx="1589903" cy="100205"/>
+          </a:xfrm>
+          <a:prstGeom prst="straightConnector1">
+            <a:avLst/>
+          </a:prstGeom>
+          <a:ln>
+            <a:tailEnd type="triangle"/>
+          </a:ln>
+        </p:spPr>
+        <p:style>
+          <a:lnRef idx="1">
+            <a:schemeClr val="accent1"/>
+          </a:lnRef>
+          <a:fillRef idx="0">
+            <a:schemeClr val="accent1"/>
+          </a:fillRef>
+          <a:effectRef idx="0">
+            <a:schemeClr val="accent1"/>
+          </a:effectRef>
+          <a:fontRef idx="minor">
+            <a:schemeClr val="tx1"/>
+          </a:fontRef>
+        </p:style>
+      </p:cxnSp>
     </p:spTree>
     <p:extLst>
       <p:ext uri="{BB962C8B-B14F-4D97-AF65-F5344CB8AC3E}">
-        <p14:creationId xmlns:p14="http://schemas.microsoft.com/office/powerpoint/2010/main" val="1035945185"/>
+        <p14:creationId xmlns:p14="http://schemas.microsoft.com/office/powerpoint/2010/main" val="1155043881"/>
       </p:ext>
     </p:extLst>
   </p:cSld>
@@ -9338,15 +9400,15 @@
           <a:p>
             <a:r>
               <a:rPr lang="nb-NO" dirty="0" smtClean="0"/>
-              <a:t>The basics: Types</a:t>
-            </a:r>
-            <a:endParaRPr lang="en-US" dirty="0"/>
-          </a:p>
-        </p:txBody>
-      </p:sp>
-      <p:sp>
-        <p:nvSpPr>
-          <p:cNvPr id="3" name="Content Placeholder 2"/>
+              <a:t>Installation: IntelliJ / WebStorm</a:t>
+            </a:r>
+            <a:endParaRPr lang="en-US" dirty="0"/>
+          </a:p>
+        </p:txBody>
+      </p:sp>
+      <p:sp>
+        <p:nvSpPr>
+          <p:cNvPr id="6" name="Content Placeholder 5"/>
           <p:cNvSpPr>
             <a:spLocks noGrp="1"/>
           </p:cNvSpPr>
@@ -9356,7 +9418,7 @@
         </p:nvSpPr>
         <p:spPr>
           <a:xfrm>
-            <a:off x="1103312" y="2069394"/>
+            <a:off x="1111279" y="2052918"/>
             <a:ext cx="8946541" cy="4195481"/>
           </a:xfrm>
         </p:spPr>
@@ -9366,45 +9428,111 @@
           <a:p>
             <a:r>
               <a:rPr lang="nb-NO" dirty="0" smtClean="0"/>
-              <a:t>Any // Base type for all types</a:t>
-            </a:r>
-          </a:p>
-          <a:p>
-            <a:pPr lvl="1"/>
-            <a:r>
-              <a:rPr lang="nb-NO" dirty="0" smtClean="0"/>
-              <a:t>Var something; // Infered to any</a:t>
-            </a:r>
-          </a:p>
-          <a:p>
-            <a:r>
-              <a:rPr lang="nb-NO" dirty="0" smtClean="0"/>
-              <a:t>String</a:t>
-            </a:r>
-          </a:p>
-          <a:p>
-            <a:pPr lvl="1"/>
-            <a:r>
-              <a:rPr lang="nb-NO" dirty="0" smtClean="0"/>
-              <a:t>Var name: string</a:t>
-            </a:r>
-          </a:p>
-          <a:p>
-            <a:pPr lvl="1"/>
-            <a:endParaRPr lang="nb-NO" dirty="0" smtClean="0"/>
-          </a:p>
-          <a:p>
-            <a:endParaRPr lang="nb-NO" dirty="0" smtClean="0"/>
-          </a:p>
-          <a:p>
-            <a:endParaRPr lang="en-US" dirty="0"/>
-          </a:p>
-        </p:txBody>
-      </p:sp>
+              <a:t>Add a File Watcher manually:</a:t>
+            </a:r>
+          </a:p>
+          <a:p>
+            <a:r>
+              <a:rPr lang="nb-NO" dirty="0" smtClean="0"/>
+              <a:t>File -&gt; Settings -&gt; [Project Settings] File Watchers -&gt; Add -&gt; TypeScript</a:t>
+            </a:r>
+            <a:endParaRPr lang="en-US" dirty="0"/>
+          </a:p>
+        </p:txBody>
+      </p:sp>
+      <p:pic>
+        <p:nvPicPr>
+          <p:cNvPr id="8" name="Picture 7"/>
+          <p:cNvPicPr>
+            <a:picLocks noChangeAspect="1"/>
+          </p:cNvPicPr>
+          <p:nvPr/>
+        </p:nvPicPr>
+        <p:blipFill>
+          <a:blip r:embed="rId2">
+            <a:extLst>
+              <a:ext uri="{28A0092B-C50C-407E-A947-70E740481C1C}">
+                <a14:useLocalDpi xmlns:a14="http://schemas.microsoft.com/office/drawing/2010/main" val="0"/>
+              </a:ext>
+            </a:extLst>
+          </a:blip>
+          <a:stretch>
+            <a:fillRect/>
+          </a:stretch>
+        </p:blipFill>
+        <p:spPr>
+          <a:xfrm>
+            <a:off x="1111279" y="3072714"/>
+            <a:ext cx="4237193" cy="3495865"/>
+          </a:xfrm>
+          <a:prstGeom prst="rect">
+            <a:avLst/>
+          </a:prstGeom>
+        </p:spPr>
+      </p:pic>
+      <p:pic>
+        <p:nvPicPr>
+          <p:cNvPr id="9" name="Picture 8"/>
+          <p:cNvPicPr>
+            <a:picLocks noChangeAspect="1"/>
+          </p:cNvPicPr>
+          <p:nvPr/>
+        </p:nvPicPr>
+        <p:blipFill>
+          <a:blip r:embed="rId3"/>
+          <a:stretch>
+            <a:fillRect/>
+          </a:stretch>
+        </p:blipFill>
+        <p:spPr>
+          <a:xfrm>
+            <a:off x="6512670" y="3072713"/>
+            <a:ext cx="3869415" cy="3495865"/>
+          </a:xfrm>
+          <a:prstGeom prst="rect">
+            <a:avLst/>
+          </a:prstGeom>
+        </p:spPr>
+      </p:pic>
+      <p:cxnSp>
+        <p:nvCxnSpPr>
+          <p:cNvPr id="11" name="Straight Arrow Connector 10"/>
+          <p:cNvCxnSpPr>
+            <a:endCxn id="9" idx="1"/>
+          </p:cNvCxnSpPr>
+          <p:nvPr/>
+        </p:nvCxnSpPr>
+        <p:spPr>
+          <a:xfrm flipV="1">
+            <a:off x="4893276" y="4820646"/>
+            <a:ext cx="1619394" cy="1118835"/>
+          </a:xfrm>
+          <a:prstGeom prst="straightConnector1">
+            <a:avLst/>
+          </a:prstGeom>
+          <a:ln>
+            <a:tailEnd type="triangle"/>
+          </a:ln>
+        </p:spPr>
+        <p:style>
+          <a:lnRef idx="1">
+            <a:schemeClr val="accent1"/>
+          </a:lnRef>
+          <a:fillRef idx="0">
+            <a:schemeClr val="accent1"/>
+          </a:fillRef>
+          <a:effectRef idx="0">
+            <a:schemeClr val="accent1"/>
+          </a:effectRef>
+          <a:fontRef idx="minor">
+            <a:schemeClr val="tx1"/>
+          </a:fontRef>
+        </p:style>
+      </p:cxnSp>
     </p:spTree>
     <p:extLst>
       <p:ext uri="{BB962C8B-B14F-4D97-AF65-F5344CB8AC3E}">
-        <p14:creationId xmlns:p14="http://schemas.microsoft.com/office/powerpoint/2010/main" val="13660248"/>
+        <p14:creationId xmlns:p14="http://schemas.microsoft.com/office/powerpoint/2010/main" val="3083607794"/>
       </p:ext>
     </p:extLst>
   </p:cSld>

</xml_diff>